<commit_message>
Updated paper details, notes, and powerpoint
</commit_message>
<xml_diff>
--- a/Investment_details.pptx
+++ b/Investment_details.pptx
@@ -105,6 +105,11 @@
       </a:defRPr>
     </a:lvl9pPr>
   </p:defaultTextStyle>
+  <p:extLst>
+    <p:ext uri="{EFAFB233-063F-42B5-8137-9DF3F51BA10A}">
+      <p15:sldGuideLst xmlns:p15="http://schemas.microsoft.com/office/powerpoint/2012/main"/>
+    </p:ext>
+  </p:extLst>
 </p:presentation>
 </file>
 
@@ -257,7 +262,7 @@
           <a:p>
             <a:fld id="{1BD1F14F-BC09-41EC-A21F-018D240FB00D}" type="datetimeFigureOut">
               <a:rPr lang="en-GB" smtClean="0"/>
-              <a:t>20/04/2021</a:t>
+              <a:t>23/04/2021</a:t>
             </a:fld>
             <a:endParaRPr lang="en-GB"/>
           </a:p>
@@ -457,7 +462,7 @@
           <a:p>
             <a:fld id="{1BD1F14F-BC09-41EC-A21F-018D240FB00D}" type="datetimeFigureOut">
               <a:rPr lang="en-GB" smtClean="0"/>
-              <a:t>20/04/2021</a:t>
+              <a:t>23/04/2021</a:t>
             </a:fld>
             <a:endParaRPr lang="en-GB"/>
           </a:p>
@@ -667,7 +672,7 @@
           <a:p>
             <a:fld id="{1BD1F14F-BC09-41EC-A21F-018D240FB00D}" type="datetimeFigureOut">
               <a:rPr lang="en-GB" smtClean="0"/>
-              <a:t>20/04/2021</a:t>
+              <a:t>23/04/2021</a:t>
             </a:fld>
             <a:endParaRPr lang="en-GB"/>
           </a:p>
@@ -867,7 +872,7 @@
           <a:p>
             <a:fld id="{1BD1F14F-BC09-41EC-A21F-018D240FB00D}" type="datetimeFigureOut">
               <a:rPr lang="en-GB" smtClean="0"/>
-              <a:t>20/04/2021</a:t>
+              <a:t>23/04/2021</a:t>
             </a:fld>
             <a:endParaRPr lang="en-GB"/>
           </a:p>
@@ -1143,7 +1148,7 @@
           <a:p>
             <a:fld id="{1BD1F14F-BC09-41EC-A21F-018D240FB00D}" type="datetimeFigureOut">
               <a:rPr lang="en-GB" smtClean="0"/>
-              <a:t>20/04/2021</a:t>
+              <a:t>23/04/2021</a:t>
             </a:fld>
             <a:endParaRPr lang="en-GB"/>
           </a:p>
@@ -1411,7 +1416,7 @@
           <a:p>
             <a:fld id="{1BD1F14F-BC09-41EC-A21F-018D240FB00D}" type="datetimeFigureOut">
               <a:rPr lang="en-GB" smtClean="0"/>
-              <a:t>20/04/2021</a:t>
+              <a:t>23/04/2021</a:t>
             </a:fld>
             <a:endParaRPr lang="en-GB"/>
           </a:p>
@@ -1826,7 +1831,7 @@
           <a:p>
             <a:fld id="{1BD1F14F-BC09-41EC-A21F-018D240FB00D}" type="datetimeFigureOut">
               <a:rPr lang="en-GB" smtClean="0"/>
-              <a:t>20/04/2021</a:t>
+              <a:t>23/04/2021</a:t>
             </a:fld>
             <a:endParaRPr lang="en-GB"/>
           </a:p>
@@ -1968,7 +1973,7 @@
           <a:p>
             <a:fld id="{1BD1F14F-BC09-41EC-A21F-018D240FB00D}" type="datetimeFigureOut">
               <a:rPr lang="en-GB" smtClean="0"/>
-              <a:t>20/04/2021</a:t>
+              <a:t>23/04/2021</a:t>
             </a:fld>
             <a:endParaRPr lang="en-GB"/>
           </a:p>
@@ -2081,7 +2086,7 @@
           <a:p>
             <a:fld id="{1BD1F14F-BC09-41EC-A21F-018D240FB00D}" type="datetimeFigureOut">
               <a:rPr lang="en-GB" smtClean="0"/>
-              <a:t>20/04/2021</a:t>
+              <a:t>23/04/2021</a:t>
             </a:fld>
             <a:endParaRPr lang="en-GB"/>
           </a:p>
@@ -2394,7 +2399,7 @@
           <a:p>
             <a:fld id="{1BD1F14F-BC09-41EC-A21F-018D240FB00D}" type="datetimeFigureOut">
               <a:rPr lang="en-GB" smtClean="0"/>
-              <a:t>20/04/2021</a:t>
+              <a:t>23/04/2021</a:t>
             </a:fld>
             <a:endParaRPr lang="en-GB"/>
           </a:p>
@@ -2683,7 +2688,7 @@
           <a:p>
             <a:fld id="{1BD1F14F-BC09-41EC-A21F-018D240FB00D}" type="datetimeFigureOut">
               <a:rPr lang="en-GB" smtClean="0"/>
-              <a:t>20/04/2021</a:t>
+              <a:t>23/04/2021</a:t>
             </a:fld>
             <a:endParaRPr lang="en-GB"/>
           </a:p>
@@ -2926,7 +2931,7 @@
           <a:p>
             <a:fld id="{1BD1F14F-BC09-41EC-A21F-018D240FB00D}" type="datetimeFigureOut">
               <a:rPr lang="en-GB" smtClean="0"/>
-              <a:t>20/04/2021</a:t>
+              <a:t>23/04/2021</a:t>
             </a:fld>
             <a:endParaRPr lang="en-GB"/>
           </a:p>
@@ -4548,6 +4553,41 @@
           </a:p>
         </p:txBody>
       </p:sp>
+      <p:sp>
+        <p:nvSpPr>
+          <p:cNvPr id="2" name="TextBox 1">
+            <a:extLst>
+              <a:ext uri="{FF2B5EF4-FFF2-40B4-BE49-F238E27FC236}">
+                <a16:creationId xmlns:a16="http://schemas.microsoft.com/office/drawing/2014/main" id="{3D484C77-CA57-4AB2-8211-BAA6A689ECB1}"/>
+              </a:ext>
+            </a:extLst>
+          </p:cNvPr>
+          <p:cNvSpPr txBox="1"/>
+          <p:nvPr/>
+        </p:nvSpPr>
+        <p:spPr>
+          <a:xfrm>
+            <a:off x="372862" y="2556769"/>
+            <a:ext cx="3773010" cy="1200329"/>
+          </a:xfrm>
+          <a:prstGeom prst="rect">
+            <a:avLst/>
+          </a:prstGeom>
+          <a:noFill/>
+        </p:spPr>
+        <p:txBody>
+          <a:bodyPr wrap="square" rtlCol="0">
+            <a:spAutoFit/>
+          </a:bodyPr>
+          <a:lstStyle/>
+          <a:p>
+            <a:r>
+              <a:rPr lang="en-GB" dirty="0"/>
+              <a:t>There is evidence that population growth rates are linked to poverty - do I want to link population growth rates with available user budgets?</a:t>
+            </a:r>
+          </a:p>
+        </p:txBody>
+      </p:sp>
     </p:spTree>
     <p:extLst>
       <p:ext uri="{BB962C8B-B14F-4D97-AF65-F5344CB8AC3E}">

</xml_diff>

<commit_message>
Updated investment powerpoint & paper details Excel
</commit_message>
<xml_diff>
--- a/Investment_details.pptx
+++ b/Investment_details.pptx
@@ -6,7 +6,11 @@
   </p:sldMasterIdLst>
   <p:sldIdLst>
     <p:sldId id="256" r:id="rId2"/>
-    <p:sldId id="257" r:id="rId3"/>
+    <p:sldId id="258" r:id="rId3"/>
+    <p:sldId id="259" r:id="rId4"/>
+    <p:sldId id="260" r:id="rId5"/>
+    <p:sldId id="261" r:id="rId6"/>
+    <p:sldId id="257" r:id="rId7"/>
   </p:sldIdLst>
   <p:sldSz cx="12192000" cy="6858000"/>
   <p:notesSz cx="6858000" cy="9144000"/>
@@ -262,7 +266,7 @@
           <a:p>
             <a:fld id="{1BD1F14F-BC09-41EC-A21F-018D240FB00D}" type="datetimeFigureOut">
               <a:rPr lang="en-GB" smtClean="0"/>
-              <a:t>23/04/2021</a:t>
+              <a:t>04/05/2021</a:t>
             </a:fld>
             <a:endParaRPr lang="en-GB"/>
           </a:p>
@@ -462,7 +466,7 @@
           <a:p>
             <a:fld id="{1BD1F14F-BC09-41EC-A21F-018D240FB00D}" type="datetimeFigureOut">
               <a:rPr lang="en-GB" smtClean="0"/>
-              <a:t>23/04/2021</a:t>
+              <a:t>04/05/2021</a:t>
             </a:fld>
             <a:endParaRPr lang="en-GB"/>
           </a:p>
@@ -672,7 +676,7 @@
           <a:p>
             <a:fld id="{1BD1F14F-BC09-41EC-A21F-018D240FB00D}" type="datetimeFigureOut">
               <a:rPr lang="en-GB" smtClean="0"/>
-              <a:t>23/04/2021</a:t>
+              <a:t>04/05/2021</a:t>
             </a:fld>
             <a:endParaRPr lang="en-GB"/>
           </a:p>
@@ -872,7 +876,7 @@
           <a:p>
             <a:fld id="{1BD1F14F-BC09-41EC-A21F-018D240FB00D}" type="datetimeFigureOut">
               <a:rPr lang="en-GB" smtClean="0"/>
-              <a:t>23/04/2021</a:t>
+              <a:t>04/05/2021</a:t>
             </a:fld>
             <a:endParaRPr lang="en-GB"/>
           </a:p>
@@ -1148,7 +1152,7 @@
           <a:p>
             <a:fld id="{1BD1F14F-BC09-41EC-A21F-018D240FB00D}" type="datetimeFigureOut">
               <a:rPr lang="en-GB" smtClean="0"/>
-              <a:t>23/04/2021</a:t>
+              <a:t>04/05/2021</a:t>
             </a:fld>
             <a:endParaRPr lang="en-GB"/>
           </a:p>
@@ -1416,7 +1420,7 @@
           <a:p>
             <a:fld id="{1BD1F14F-BC09-41EC-A21F-018D240FB00D}" type="datetimeFigureOut">
               <a:rPr lang="en-GB" smtClean="0"/>
-              <a:t>23/04/2021</a:t>
+              <a:t>04/05/2021</a:t>
             </a:fld>
             <a:endParaRPr lang="en-GB"/>
           </a:p>
@@ -1831,7 +1835,7 @@
           <a:p>
             <a:fld id="{1BD1F14F-BC09-41EC-A21F-018D240FB00D}" type="datetimeFigureOut">
               <a:rPr lang="en-GB" smtClean="0"/>
-              <a:t>23/04/2021</a:t>
+              <a:t>04/05/2021</a:t>
             </a:fld>
             <a:endParaRPr lang="en-GB"/>
           </a:p>
@@ -1973,7 +1977,7 @@
           <a:p>
             <a:fld id="{1BD1F14F-BC09-41EC-A21F-018D240FB00D}" type="datetimeFigureOut">
               <a:rPr lang="en-GB" smtClean="0"/>
-              <a:t>23/04/2021</a:t>
+              <a:t>04/05/2021</a:t>
             </a:fld>
             <a:endParaRPr lang="en-GB"/>
           </a:p>
@@ -2086,7 +2090,7 @@
           <a:p>
             <a:fld id="{1BD1F14F-BC09-41EC-A21F-018D240FB00D}" type="datetimeFigureOut">
               <a:rPr lang="en-GB" smtClean="0"/>
-              <a:t>23/04/2021</a:t>
+              <a:t>04/05/2021</a:t>
             </a:fld>
             <a:endParaRPr lang="en-GB"/>
           </a:p>
@@ -2399,7 +2403,7 @@
           <a:p>
             <a:fld id="{1BD1F14F-BC09-41EC-A21F-018D240FB00D}" type="datetimeFigureOut">
               <a:rPr lang="en-GB" smtClean="0"/>
-              <a:t>23/04/2021</a:t>
+              <a:t>04/05/2021</a:t>
             </a:fld>
             <a:endParaRPr lang="en-GB"/>
           </a:p>
@@ -2688,7 +2692,7 @@
           <a:p>
             <a:fld id="{1BD1F14F-BC09-41EC-A21F-018D240FB00D}" type="datetimeFigureOut">
               <a:rPr lang="en-GB" smtClean="0"/>
-              <a:t>23/04/2021</a:t>
+              <a:t>04/05/2021</a:t>
             </a:fld>
             <a:endParaRPr lang="en-GB"/>
           </a:p>
@@ -2931,7 +2935,7 @@
           <a:p>
             <a:fld id="{1BD1F14F-BC09-41EC-A21F-018D240FB00D}" type="datetimeFigureOut">
               <a:rPr lang="en-GB" smtClean="0"/>
-              <a:t>23/04/2021</a:t>
+              <a:t>04/05/2021</a:t>
             </a:fld>
             <a:endParaRPr lang="en-GB"/>
           </a:p>
@@ -4394,7 +4398,7 @@
         <p:spPr>
           <a:xfrm>
             <a:off x="5851953" y="3404525"/>
-            <a:ext cx="6340047" cy="1477328"/>
+            <a:ext cx="6340047" cy="1754326"/>
           </a:xfrm>
           <a:prstGeom prst="rect">
             <a:avLst/>
@@ -4421,7 +4425,7 @@
             </a:pPr>
             <a:r>
               <a:rPr lang="en-GB" dirty="0"/>
-              <a:t>What effect does communal indigenous land titling have? I.e. when users act independently or together</a:t>
+              <a:t>Possible second question - What effect does communal indigenous land titling have? I.e. when users act independently or together</a:t>
             </a:r>
           </a:p>
         </p:txBody>
@@ -4456,12 +4460,126 @@
           <a:chExt cx="0" cy="0"/>
         </a:xfrm>
       </p:grpSpPr>
-      <p:sp>
-        <p:nvSpPr>
-          <p:cNvPr id="4" name="TextBox 3">
-            <a:extLst>
-              <a:ext uri="{FF2B5EF4-FFF2-40B4-BE49-F238E27FC236}">
-                <a16:creationId xmlns:a16="http://schemas.microsoft.com/office/drawing/2014/main" id="{E316D952-5480-4407-9095-1FEFBCA01266}"/>
+      <p:cxnSp>
+        <p:nvCxnSpPr>
+          <p:cNvPr id="10" name="Straight Connector 9">
+            <a:extLst>
+              <a:ext uri="{FF2B5EF4-FFF2-40B4-BE49-F238E27FC236}">
+                <a16:creationId xmlns:a16="http://schemas.microsoft.com/office/drawing/2014/main" id="{094261D8-2146-43CA-B5D6-340C8AF38F16}"/>
+              </a:ext>
+            </a:extLst>
+          </p:cNvPr>
+          <p:cNvCxnSpPr/>
+          <p:nvPr/>
+        </p:nvCxnSpPr>
+        <p:spPr>
+          <a:xfrm>
+            <a:off x="828583" y="689991"/>
+            <a:ext cx="0" cy="2113808"/>
+          </a:xfrm>
+          <a:prstGeom prst="line">
+            <a:avLst/>
+          </a:prstGeom>
+          <a:ln w="19050"/>
+        </p:spPr>
+        <p:style>
+          <a:lnRef idx="1">
+            <a:schemeClr val="dk1"/>
+          </a:lnRef>
+          <a:fillRef idx="0">
+            <a:schemeClr val="dk1"/>
+          </a:fillRef>
+          <a:effectRef idx="0">
+            <a:schemeClr val="dk1"/>
+          </a:effectRef>
+          <a:fontRef idx="minor">
+            <a:schemeClr val="tx1"/>
+          </a:fontRef>
+        </p:style>
+      </p:cxnSp>
+      <p:cxnSp>
+        <p:nvCxnSpPr>
+          <p:cNvPr id="13" name="Straight Connector 12">
+            <a:extLst>
+              <a:ext uri="{FF2B5EF4-FFF2-40B4-BE49-F238E27FC236}">
+                <a16:creationId xmlns:a16="http://schemas.microsoft.com/office/drawing/2014/main" id="{AA0189CA-8C60-4044-A249-AF22B9A45052}"/>
+              </a:ext>
+            </a:extLst>
+          </p:cNvPr>
+          <p:cNvCxnSpPr>
+            <a:cxnSpLocks/>
+          </p:cNvCxnSpPr>
+          <p:nvPr/>
+        </p:nvCxnSpPr>
+        <p:spPr>
+          <a:xfrm flipH="1">
+            <a:off x="828583" y="2803799"/>
+            <a:ext cx="2196935" cy="0"/>
+          </a:xfrm>
+          <a:prstGeom prst="line">
+            <a:avLst/>
+          </a:prstGeom>
+          <a:ln w="19050"/>
+        </p:spPr>
+        <p:style>
+          <a:lnRef idx="1">
+            <a:schemeClr val="dk1"/>
+          </a:lnRef>
+          <a:fillRef idx="0">
+            <a:schemeClr val="dk1"/>
+          </a:fillRef>
+          <a:effectRef idx="0">
+            <a:schemeClr val="dk1"/>
+          </a:effectRef>
+          <a:fontRef idx="minor">
+            <a:schemeClr val="tx1"/>
+          </a:fontRef>
+        </p:style>
+      </p:cxnSp>
+      <p:cxnSp>
+        <p:nvCxnSpPr>
+          <p:cNvPr id="17" name="Straight Connector 16">
+            <a:extLst>
+              <a:ext uri="{FF2B5EF4-FFF2-40B4-BE49-F238E27FC236}">
+                <a16:creationId xmlns:a16="http://schemas.microsoft.com/office/drawing/2014/main" id="{90C920CB-45EF-44B8-9419-5319CE12E9F9}"/>
+              </a:ext>
+            </a:extLst>
+          </p:cNvPr>
+          <p:cNvCxnSpPr>
+            <a:cxnSpLocks/>
+          </p:cNvCxnSpPr>
+          <p:nvPr/>
+        </p:nvCxnSpPr>
+        <p:spPr>
+          <a:xfrm flipV="1">
+            <a:off x="828583" y="1063668"/>
+            <a:ext cx="1825633" cy="1740131"/>
+          </a:xfrm>
+          <a:prstGeom prst="line">
+            <a:avLst/>
+          </a:prstGeom>
+        </p:spPr>
+        <p:style>
+          <a:lnRef idx="1">
+            <a:schemeClr val="accent1"/>
+          </a:lnRef>
+          <a:fillRef idx="0">
+            <a:schemeClr val="accent1"/>
+          </a:fillRef>
+          <a:effectRef idx="0">
+            <a:schemeClr val="accent1"/>
+          </a:effectRef>
+          <a:fontRef idx="minor">
+            <a:schemeClr val="tx1"/>
+          </a:fontRef>
+        </p:style>
+      </p:cxnSp>
+      <p:sp>
+        <p:nvSpPr>
+          <p:cNvPr id="19" name="TextBox 18">
+            <a:extLst>
+              <a:ext uri="{FF2B5EF4-FFF2-40B4-BE49-F238E27FC236}">
+                <a16:creationId xmlns:a16="http://schemas.microsoft.com/office/drawing/2014/main" id="{EA979FD9-C2E1-40B9-B5F6-CEB26EE04986}"/>
               </a:ext>
             </a:extLst>
           </p:cNvPr>
@@ -4470,8 +4588,8 @@
         </p:nvSpPr>
         <p:spPr>
           <a:xfrm>
-            <a:off x="177553" y="266330"/>
-            <a:ext cx="2121764" cy="369332"/>
+            <a:off x="1661439" y="2839425"/>
+            <a:ext cx="731520" cy="338554"/>
           </a:xfrm>
           <a:prstGeom prst="rect">
             <a:avLst/>
@@ -4485,18 +4603,18 @@
           <a:lstStyle/>
           <a:p>
             <a:r>
-              <a:rPr lang="en-GB" dirty="0"/>
-              <a:t>Population density</a:t>
-            </a:r>
-          </a:p>
-        </p:txBody>
-      </p:sp>
-      <p:sp>
-        <p:nvSpPr>
-          <p:cNvPr id="5" name="TextBox 4">
-            <a:extLst>
-              <a:ext uri="{FF2B5EF4-FFF2-40B4-BE49-F238E27FC236}">
-                <a16:creationId xmlns:a16="http://schemas.microsoft.com/office/drawing/2014/main" id="{4996B508-F86A-41F0-9FB0-7DB92064184D}"/>
+              <a:rPr lang="en-GB" sz="1600" dirty="0"/>
+              <a:t>Time</a:t>
+            </a:r>
+          </a:p>
+        </p:txBody>
+      </p:sp>
+      <p:sp>
+        <p:nvSpPr>
+          <p:cNvPr id="20" name="TextBox 19">
+            <a:extLst>
+              <a:ext uri="{FF2B5EF4-FFF2-40B4-BE49-F238E27FC236}">
+                <a16:creationId xmlns:a16="http://schemas.microsoft.com/office/drawing/2014/main" id="{9AD8BC09-B723-4C35-91B3-1DD83900C373}"/>
               </a:ext>
             </a:extLst>
           </p:cNvPr>
@@ -4505,8 +4623,8 @@
         </p:nvSpPr>
         <p:spPr>
           <a:xfrm>
-            <a:off x="177552" y="790113"/>
-            <a:ext cx="9463597" cy="1200329"/>
+            <a:off x="-8703" y="1413189"/>
+            <a:ext cx="1065975" cy="338554"/>
           </a:xfrm>
           <a:prstGeom prst="rect">
             <a:avLst/>
@@ -4520,45 +4638,56 @@
           <a:lstStyle/>
           <a:p>
             <a:r>
-              <a:rPr lang="en-GB" dirty="0"/>
-              <a:t>Scenarios:</a:t>
-            </a:r>
-          </a:p>
-          <a:p>
-            <a:pPr marL="342900" indent="-342900">
-              <a:buAutoNum type="arabicParenR"/>
-            </a:pPr>
-            <a:r>
-              <a:rPr lang="en-GB" dirty="0"/>
-              <a:t>Steady (linear) increase in population density over time</a:t>
-            </a:r>
-          </a:p>
-          <a:p>
-            <a:pPr marL="342900" indent="-342900">
-              <a:buAutoNum type="arabicParenR"/>
-            </a:pPr>
-            <a:r>
-              <a:rPr lang="en-GB" dirty="0"/>
-              <a:t>Exponential increase over time</a:t>
-            </a:r>
-          </a:p>
-          <a:p>
-            <a:pPr marL="342900" indent="-342900">
-              <a:buAutoNum type="arabicParenR"/>
-            </a:pPr>
-            <a:r>
-              <a:rPr lang="en-GB" dirty="0"/>
-              <a:t>Regular but temporary surges (migration? Economic development / requirements)</a:t>
-            </a:r>
-          </a:p>
-        </p:txBody>
-      </p:sp>
-      <p:sp>
-        <p:nvSpPr>
-          <p:cNvPr id="2" name="TextBox 1">
-            <a:extLst>
-              <a:ext uri="{FF2B5EF4-FFF2-40B4-BE49-F238E27FC236}">
-                <a16:creationId xmlns:a16="http://schemas.microsoft.com/office/drawing/2014/main" id="{3D484C77-CA57-4AB2-8211-BAA6A689ECB1}"/>
+              <a:rPr lang="en-GB" sz="1600" dirty="0"/>
+              <a:t>Budgets</a:t>
+            </a:r>
+          </a:p>
+        </p:txBody>
+      </p:sp>
+      <p:cxnSp>
+        <p:nvCxnSpPr>
+          <p:cNvPr id="21" name="Straight Connector 20">
+            <a:extLst>
+              <a:ext uri="{FF2B5EF4-FFF2-40B4-BE49-F238E27FC236}">
+                <a16:creationId xmlns:a16="http://schemas.microsoft.com/office/drawing/2014/main" id="{15B38921-446E-41C0-8587-757E77A8AE2B}"/>
+              </a:ext>
+            </a:extLst>
+          </p:cNvPr>
+          <p:cNvCxnSpPr>
+            <a:cxnSpLocks/>
+          </p:cNvCxnSpPr>
+          <p:nvPr/>
+        </p:nvCxnSpPr>
+        <p:spPr>
+          <a:xfrm flipV="1">
+            <a:off x="1005856" y="1054430"/>
+            <a:ext cx="1825633" cy="1740131"/>
+          </a:xfrm>
+          <a:prstGeom prst="line">
+            <a:avLst/>
+          </a:prstGeom>
+        </p:spPr>
+        <p:style>
+          <a:lnRef idx="1">
+            <a:schemeClr val="accent6"/>
+          </a:lnRef>
+          <a:fillRef idx="0">
+            <a:schemeClr val="accent6"/>
+          </a:fillRef>
+          <a:effectRef idx="0">
+            <a:schemeClr val="accent6"/>
+          </a:effectRef>
+          <a:fontRef idx="minor">
+            <a:schemeClr val="tx1"/>
+          </a:fontRef>
+        </p:style>
+      </p:cxnSp>
+      <p:sp>
+        <p:nvSpPr>
+          <p:cNvPr id="22" name="TextBox 21">
+            <a:extLst>
+              <a:ext uri="{FF2B5EF4-FFF2-40B4-BE49-F238E27FC236}">
+                <a16:creationId xmlns:a16="http://schemas.microsoft.com/office/drawing/2014/main" id="{F342FFCE-9431-4E13-92E5-775EB3A8F077}"/>
               </a:ext>
             </a:extLst>
           </p:cNvPr>
@@ -4567,8 +4696,8 @@
         </p:nvSpPr>
         <p:spPr>
           <a:xfrm>
-            <a:off x="372862" y="2556769"/>
-            <a:ext cx="3773010" cy="1200329"/>
+            <a:off x="4347044" y="1698614"/>
+            <a:ext cx="3242930" cy="923330"/>
           </a:xfrm>
           <a:prstGeom prst="rect">
             <a:avLst/>
@@ -4583,7 +4712,2869 @@
           <a:p>
             <a:r>
               <a:rPr lang="en-GB" dirty="0"/>
-              <a:t>There is evidence that population growth rates are linked to poverty - do I want to link population growth rates with available user budgets?</a:t>
+              <a:t>“optimistic” null scenario – i.e. manager budgets increase in line with user budgets</a:t>
+            </a:r>
+          </a:p>
+        </p:txBody>
+      </p:sp>
+      <p:cxnSp>
+        <p:nvCxnSpPr>
+          <p:cNvPr id="23" name="Straight Connector 22">
+            <a:extLst>
+              <a:ext uri="{FF2B5EF4-FFF2-40B4-BE49-F238E27FC236}">
+                <a16:creationId xmlns:a16="http://schemas.microsoft.com/office/drawing/2014/main" id="{AE255288-4BAC-464D-AC61-E0832FD0D28D}"/>
+              </a:ext>
+            </a:extLst>
+          </p:cNvPr>
+          <p:cNvCxnSpPr/>
+          <p:nvPr/>
+        </p:nvCxnSpPr>
+        <p:spPr>
+          <a:xfrm>
+            <a:off x="832122" y="3617796"/>
+            <a:ext cx="0" cy="2113808"/>
+          </a:xfrm>
+          <a:prstGeom prst="line">
+            <a:avLst/>
+          </a:prstGeom>
+          <a:ln w="19050"/>
+        </p:spPr>
+        <p:style>
+          <a:lnRef idx="1">
+            <a:schemeClr val="dk1"/>
+          </a:lnRef>
+          <a:fillRef idx="0">
+            <a:schemeClr val="dk1"/>
+          </a:fillRef>
+          <a:effectRef idx="0">
+            <a:schemeClr val="dk1"/>
+          </a:effectRef>
+          <a:fontRef idx="minor">
+            <a:schemeClr val="tx1"/>
+          </a:fontRef>
+        </p:style>
+      </p:cxnSp>
+      <p:cxnSp>
+        <p:nvCxnSpPr>
+          <p:cNvPr id="24" name="Straight Connector 23">
+            <a:extLst>
+              <a:ext uri="{FF2B5EF4-FFF2-40B4-BE49-F238E27FC236}">
+                <a16:creationId xmlns:a16="http://schemas.microsoft.com/office/drawing/2014/main" id="{E25EC052-3E4C-49B9-8879-98C01F233662}"/>
+              </a:ext>
+            </a:extLst>
+          </p:cNvPr>
+          <p:cNvCxnSpPr>
+            <a:cxnSpLocks/>
+          </p:cNvCxnSpPr>
+          <p:nvPr/>
+        </p:nvCxnSpPr>
+        <p:spPr>
+          <a:xfrm flipH="1">
+            <a:off x="832122" y="5731604"/>
+            <a:ext cx="2196935" cy="0"/>
+          </a:xfrm>
+          <a:prstGeom prst="line">
+            <a:avLst/>
+          </a:prstGeom>
+          <a:ln w="19050"/>
+        </p:spPr>
+        <p:style>
+          <a:lnRef idx="1">
+            <a:schemeClr val="dk1"/>
+          </a:lnRef>
+          <a:fillRef idx="0">
+            <a:schemeClr val="dk1"/>
+          </a:fillRef>
+          <a:effectRef idx="0">
+            <a:schemeClr val="dk1"/>
+          </a:effectRef>
+          <a:fontRef idx="minor">
+            <a:schemeClr val="tx1"/>
+          </a:fontRef>
+        </p:style>
+      </p:cxnSp>
+      <p:cxnSp>
+        <p:nvCxnSpPr>
+          <p:cNvPr id="25" name="Straight Connector 24">
+            <a:extLst>
+              <a:ext uri="{FF2B5EF4-FFF2-40B4-BE49-F238E27FC236}">
+                <a16:creationId xmlns:a16="http://schemas.microsoft.com/office/drawing/2014/main" id="{66C22D47-BC2C-477E-9DD5-40127066F8A2}"/>
+              </a:ext>
+            </a:extLst>
+          </p:cNvPr>
+          <p:cNvCxnSpPr>
+            <a:cxnSpLocks/>
+          </p:cNvCxnSpPr>
+          <p:nvPr/>
+        </p:nvCxnSpPr>
+        <p:spPr>
+          <a:xfrm flipV="1">
+            <a:off x="832122" y="3991473"/>
+            <a:ext cx="1825633" cy="1740131"/>
+          </a:xfrm>
+          <a:prstGeom prst="line">
+            <a:avLst/>
+          </a:prstGeom>
+        </p:spPr>
+        <p:style>
+          <a:lnRef idx="1">
+            <a:schemeClr val="accent1"/>
+          </a:lnRef>
+          <a:fillRef idx="0">
+            <a:schemeClr val="accent1"/>
+          </a:fillRef>
+          <a:effectRef idx="0">
+            <a:schemeClr val="accent1"/>
+          </a:effectRef>
+          <a:fontRef idx="minor">
+            <a:schemeClr val="tx1"/>
+          </a:fontRef>
+        </p:style>
+      </p:cxnSp>
+      <p:sp>
+        <p:nvSpPr>
+          <p:cNvPr id="26" name="TextBox 25">
+            <a:extLst>
+              <a:ext uri="{FF2B5EF4-FFF2-40B4-BE49-F238E27FC236}">
+                <a16:creationId xmlns:a16="http://schemas.microsoft.com/office/drawing/2014/main" id="{002147F5-3D77-4EC9-830A-B6A11A3126B5}"/>
+              </a:ext>
+            </a:extLst>
+          </p:cNvPr>
+          <p:cNvSpPr txBox="1"/>
+          <p:nvPr/>
+        </p:nvSpPr>
+        <p:spPr>
+          <a:xfrm>
+            <a:off x="1664978" y="5767230"/>
+            <a:ext cx="731520" cy="338554"/>
+          </a:xfrm>
+          <a:prstGeom prst="rect">
+            <a:avLst/>
+          </a:prstGeom>
+          <a:noFill/>
+        </p:spPr>
+        <p:txBody>
+          <a:bodyPr wrap="square" rtlCol="0">
+            <a:spAutoFit/>
+          </a:bodyPr>
+          <a:lstStyle/>
+          <a:p>
+            <a:r>
+              <a:rPr lang="en-GB" sz="1600" dirty="0"/>
+              <a:t>Time</a:t>
+            </a:r>
+          </a:p>
+        </p:txBody>
+      </p:sp>
+      <p:sp>
+        <p:nvSpPr>
+          <p:cNvPr id="27" name="TextBox 26">
+            <a:extLst>
+              <a:ext uri="{FF2B5EF4-FFF2-40B4-BE49-F238E27FC236}">
+                <a16:creationId xmlns:a16="http://schemas.microsoft.com/office/drawing/2014/main" id="{CE042842-5520-4125-8CF3-93A4AE561AB4}"/>
+              </a:ext>
+            </a:extLst>
+          </p:cNvPr>
+          <p:cNvSpPr txBox="1"/>
+          <p:nvPr/>
+        </p:nvSpPr>
+        <p:spPr>
+          <a:xfrm>
+            <a:off x="-5164" y="4340994"/>
+            <a:ext cx="1065975" cy="338554"/>
+          </a:xfrm>
+          <a:prstGeom prst="rect">
+            <a:avLst/>
+          </a:prstGeom>
+          <a:noFill/>
+        </p:spPr>
+        <p:txBody>
+          <a:bodyPr wrap="square" rtlCol="0">
+            <a:spAutoFit/>
+          </a:bodyPr>
+          <a:lstStyle/>
+          <a:p>
+            <a:r>
+              <a:rPr lang="en-GB" sz="1600" dirty="0"/>
+              <a:t>Budgets</a:t>
+            </a:r>
+          </a:p>
+        </p:txBody>
+      </p:sp>
+      <p:cxnSp>
+        <p:nvCxnSpPr>
+          <p:cNvPr id="28" name="Straight Connector 27">
+            <a:extLst>
+              <a:ext uri="{FF2B5EF4-FFF2-40B4-BE49-F238E27FC236}">
+                <a16:creationId xmlns:a16="http://schemas.microsoft.com/office/drawing/2014/main" id="{EDF210E9-1803-4696-853E-1DCFB0C01912}"/>
+              </a:ext>
+            </a:extLst>
+          </p:cNvPr>
+          <p:cNvCxnSpPr>
+            <a:cxnSpLocks/>
+          </p:cNvCxnSpPr>
+          <p:nvPr/>
+        </p:nvCxnSpPr>
+        <p:spPr>
+          <a:xfrm flipV="1">
+            <a:off x="839849" y="5020887"/>
+            <a:ext cx="2073472" cy="1"/>
+          </a:xfrm>
+          <a:prstGeom prst="line">
+            <a:avLst/>
+          </a:prstGeom>
+        </p:spPr>
+        <p:style>
+          <a:lnRef idx="1">
+            <a:schemeClr val="accent6"/>
+          </a:lnRef>
+          <a:fillRef idx="0">
+            <a:schemeClr val="accent6"/>
+          </a:fillRef>
+          <a:effectRef idx="0">
+            <a:schemeClr val="accent6"/>
+          </a:effectRef>
+          <a:fontRef idx="minor">
+            <a:schemeClr val="tx1"/>
+          </a:fontRef>
+        </p:style>
+      </p:cxnSp>
+      <p:sp>
+        <p:nvSpPr>
+          <p:cNvPr id="30" name="TextBox 29">
+            <a:extLst>
+              <a:ext uri="{FF2B5EF4-FFF2-40B4-BE49-F238E27FC236}">
+                <a16:creationId xmlns:a16="http://schemas.microsoft.com/office/drawing/2014/main" id="{2C3B1D62-1D3A-4FC8-A03C-24C977E41E17}"/>
+              </a:ext>
+            </a:extLst>
+          </p:cNvPr>
+          <p:cNvSpPr txBox="1"/>
+          <p:nvPr/>
+        </p:nvSpPr>
+        <p:spPr>
+          <a:xfrm>
+            <a:off x="4347044" y="4697721"/>
+            <a:ext cx="3242930" cy="923330"/>
+          </a:xfrm>
+          <a:prstGeom prst="rect">
+            <a:avLst/>
+          </a:prstGeom>
+          <a:noFill/>
+        </p:spPr>
+        <p:txBody>
+          <a:bodyPr wrap="square" rtlCol="0">
+            <a:spAutoFit/>
+          </a:bodyPr>
+          <a:lstStyle/>
+          <a:p>
+            <a:r>
+              <a:rPr lang="en-GB" dirty="0"/>
+              <a:t>“pessimistic” null scenario – i.e. manager budgets do not increase over time</a:t>
+            </a:r>
+          </a:p>
+        </p:txBody>
+      </p:sp>
+      <p:sp>
+        <p:nvSpPr>
+          <p:cNvPr id="31" name="TextBox 30">
+            <a:extLst>
+              <a:ext uri="{FF2B5EF4-FFF2-40B4-BE49-F238E27FC236}">
+                <a16:creationId xmlns:a16="http://schemas.microsoft.com/office/drawing/2014/main" id="{92813AEB-48FE-413A-9A00-DFCE05C28C04}"/>
+              </a:ext>
+            </a:extLst>
+          </p:cNvPr>
+          <p:cNvSpPr txBox="1"/>
+          <p:nvPr/>
+        </p:nvSpPr>
+        <p:spPr>
+          <a:xfrm>
+            <a:off x="3025518" y="4882387"/>
+            <a:ext cx="953763" cy="276999"/>
+          </a:xfrm>
+          <a:prstGeom prst="rect">
+            <a:avLst/>
+          </a:prstGeom>
+          <a:noFill/>
+        </p:spPr>
+        <p:txBody>
+          <a:bodyPr wrap="square" rtlCol="0">
+            <a:spAutoFit/>
+          </a:bodyPr>
+          <a:lstStyle/>
+          <a:p>
+            <a:r>
+              <a:rPr lang="en-GB" sz="1200" dirty="0"/>
+              <a:t>Manager</a:t>
+            </a:r>
+          </a:p>
+        </p:txBody>
+      </p:sp>
+      <p:sp>
+        <p:nvSpPr>
+          <p:cNvPr id="32" name="TextBox 31">
+            <a:extLst>
+              <a:ext uri="{FF2B5EF4-FFF2-40B4-BE49-F238E27FC236}">
+                <a16:creationId xmlns:a16="http://schemas.microsoft.com/office/drawing/2014/main" id="{A0A4275D-3A75-4641-96AF-F37B08D99372}"/>
+              </a:ext>
+            </a:extLst>
+          </p:cNvPr>
+          <p:cNvSpPr txBox="1"/>
+          <p:nvPr/>
+        </p:nvSpPr>
+        <p:spPr>
+          <a:xfrm>
+            <a:off x="2654216" y="3794147"/>
+            <a:ext cx="953763" cy="276999"/>
+          </a:xfrm>
+          <a:prstGeom prst="rect">
+            <a:avLst/>
+          </a:prstGeom>
+          <a:noFill/>
+        </p:spPr>
+        <p:txBody>
+          <a:bodyPr wrap="square" rtlCol="0">
+            <a:spAutoFit/>
+          </a:bodyPr>
+          <a:lstStyle/>
+          <a:p>
+            <a:r>
+              <a:rPr lang="en-GB" sz="1200" dirty="0"/>
+              <a:t>User</a:t>
+            </a:r>
+          </a:p>
+        </p:txBody>
+      </p:sp>
+      <p:sp>
+        <p:nvSpPr>
+          <p:cNvPr id="33" name="TextBox 32">
+            <a:extLst>
+              <a:ext uri="{FF2B5EF4-FFF2-40B4-BE49-F238E27FC236}">
+                <a16:creationId xmlns:a16="http://schemas.microsoft.com/office/drawing/2014/main" id="{894F7139-FEB4-4D21-AC16-653C1B8A7CB3}"/>
+              </a:ext>
+            </a:extLst>
+          </p:cNvPr>
+          <p:cNvSpPr txBox="1"/>
+          <p:nvPr/>
+        </p:nvSpPr>
+        <p:spPr>
+          <a:xfrm>
+            <a:off x="3979281" y="128187"/>
+            <a:ext cx="2336057" cy="369332"/>
+          </a:xfrm>
+          <a:prstGeom prst="rect">
+            <a:avLst/>
+          </a:prstGeom>
+          <a:noFill/>
+        </p:spPr>
+        <p:txBody>
+          <a:bodyPr wrap="square" rtlCol="0">
+            <a:spAutoFit/>
+          </a:bodyPr>
+          <a:lstStyle/>
+          <a:p>
+            <a:r>
+              <a:rPr lang="en-GB" b="1" dirty="0"/>
+              <a:t>NULL SCENARIOS</a:t>
+            </a:r>
+          </a:p>
+        </p:txBody>
+      </p:sp>
+      <p:sp>
+        <p:nvSpPr>
+          <p:cNvPr id="34" name="TextBox 33">
+            <a:extLst>
+              <a:ext uri="{FF2B5EF4-FFF2-40B4-BE49-F238E27FC236}">
+                <a16:creationId xmlns:a16="http://schemas.microsoft.com/office/drawing/2014/main" id="{2CC486C6-1F66-4614-A563-338CF6174746}"/>
+              </a:ext>
+            </a:extLst>
+          </p:cNvPr>
+          <p:cNvSpPr txBox="1"/>
+          <p:nvPr/>
+        </p:nvSpPr>
+        <p:spPr>
+          <a:xfrm>
+            <a:off x="2054998" y="871198"/>
+            <a:ext cx="953763" cy="276999"/>
+          </a:xfrm>
+          <a:prstGeom prst="rect">
+            <a:avLst/>
+          </a:prstGeom>
+          <a:noFill/>
+        </p:spPr>
+        <p:txBody>
+          <a:bodyPr wrap="square" rtlCol="0">
+            <a:spAutoFit/>
+          </a:bodyPr>
+          <a:lstStyle/>
+          <a:p>
+            <a:r>
+              <a:rPr lang="en-GB" sz="1200" dirty="0"/>
+              <a:t>User</a:t>
+            </a:r>
+          </a:p>
+        </p:txBody>
+      </p:sp>
+      <p:sp>
+        <p:nvSpPr>
+          <p:cNvPr id="35" name="TextBox 34">
+            <a:extLst>
+              <a:ext uri="{FF2B5EF4-FFF2-40B4-BE49-F238E27FC236}">
+                <a16:creationId xmlns:a16="http://schemas.microsoft.com/office/drawing/2014/main" id="{364A7EF4-9265-439E-A5AE-BBA412B3C449}"/>
+              </a:ext>
+            </a:extLst>
+          </p:cNvPr>
+          <p:cNvSpPr txBox="1"/>
+          <p:nvPr/>
+        </p:nvSpPr>
+        <p:spPr>
+          <a:xfrm>
+            <a:off x="2831488" y="987895"/>
+            <a:ext cx="953763" cy="276999"/>
+          </a:xfrm>
+          <a:prstGeom prst="rect">
+            <a:avLst/>
+          </a:prstGeom>
+          <a:noFill/>
+        </p:spPr>
+        <p:txBody>
+          <a:bodyPr wrap="square" rtlCol="0">
+            <a:spAutoFit/>
+          </a:bodyPr>
+          <a:lstStyle/>
+          <a:p>
+            <a:r>
+              <a:rPr lang="en-GB" sz="1200" dirty="0"/>
+              <a:t>Manager</a:t>
+            </a:r>
+          </a:p>
+        </p:txBody>
+      </p:sp>
+    </p:spTree>
+    <p:extLst>
+      <p:ext uri="{BB962C8B-B14F-4D97-AF65-F5344CB8AC3E}">
+        <p14:creationId xmlns:p14="http://schemas.microsoft.com/office/powerpoint/2010/main" val="244165640"/>
+      </p:ext>
+    </p:extLst>
+  </p:cSld>
+  <p:clrMapOvr>
+    <a:masterClrMapping/>
+  </p:clrMapOvr>
+</p:sld>
+</file>
+
+<file path=ppt/slides/slide3.xml><?xml version="1.0" encoding="utf-8"?>
+<p:sld xmlns:a="http://schemas.openxmlformats.org/drawingml/2006/main" xmlns:r="http://schemas.openxmlformats.org/officeDocument/2006/relationships" xmlns:p="http://schemas.openxmlformats.org/presentationml/2006/main">
+  <p:cSld>
+    <p:spTree>
+      <p:nvGrpSpPr>
+        <p:cNvPr id="1" name=""/>
+        <p:cNvGrpSpPr/>
+        <p:nvPr/>
+      </p:nvGrpSpPr>
+      <p:grpSpPr>
+        <a:xfrm>
+          <a:off x="0" y="0"/>
+          <a:ext cx="0" cy="0"/>
+          <a:chOff x="0" y="0"/>
+          <a:chExt cx="0" cy="0"/>
+        </a:xfrm>
+      </p:grpSpPr>
+      <p:cxnSp>
+        <p:nvCxnSpPr>
+          <p:cNvPr id="4" name="Straight Connector 3">
+            <a:extLst>
+              <a:ext uri="{FF2B5EF4-FFF2-40B4-BE49-F238E27FC236}">
+                <a16:creationId xmlns:a16="http://schemas.microsoft.com/office/drawing/2014/main" id="{79C88D2C-103A-4FD4-8DED-8F4FC06BC794}"/>
+              </a:ext>
+            </a:extLst>
+          </p:cNvPr>
+          <p:cNvCxnSpPr/>
+          <p:nvPr/>
+        </p:nvCxnSpPr>
+        <p:spPr>
+          <a:xfrm>
+            <a:off x="828583" y="1151460"/>
+            <a:ext cx="0" cy="2113808"/>
+          </a:xfrm>
+          <a:prstGeom prst="line">
+            <a:avLst/>
+          </a:prstGeom>
+          <a:ln w="19050"/>
+        </p:spPr>
+        <p:style>
+          <a:lnRef idx="1">
+            <a:schemeClr val="dk1"/>
+          </a:lnRef>
+          <a:fillRef idx="0">
+            <a:schemeClr val="dk1"/>
+          </a:fillRef>
+          <a:effectRef idx="0">
+            <a:schemeClr val="dk1"/>
+          </a:effectRef>
+          <a:fontRef idx="minor">
+            <a:schemeClr val="tx1"/>
+          </a:fontRef>
+        </p:style>
+      </p:cxnSp>
+      <p:cxnSp>
+        <p:nvCxnSpPr>
+          <p:cNvPr id="5" name="Straight Connector 4">
+            <a:extLst>
+              <a:ext uri="{FF2B5EF4-FFF2-40B4-BE49-F238E27FC236}">
+                <a16:creationId xmlns:a16="http://schemas.microsoft.com/office/drawing/2014/main" id="{5F1C5483-F4F2-4C62-ADB6-B7119C9E4AB0}"/>
+              </a:ext>
+            </a:extLst>
+          </p:cNvPr>
+          <p:cNvCxnSpPr>
+            <a:cxnSpLocks/>
+          </p:cNvCxnSpPr>
+          <p:nvPr/>
+        </p:nvCxnSpPr>
+        <p:spPr>
+          <a:xfrm flipH="1">
+            <a:off x="828583" y="3265268"/>
+            <a:ext cx="2196935" cy="0"/>
+          </a:xfrm>
+          <a:prstGeom prst="line">
+            <a:avLst/>
+          </a:prstGeom>
+          <a:ln w="19050"/>
+        </p:spPr>
+        <p:style>
+          <a:lnRef idx="1">
+            <a:schemeClr val="dk1"/>
+          </a:lnRef>
+          <a:fillRef idx="0">
+            <a:schemeClr val="dk1"/>
+          </a:fillRef>
+          <a:effectRef idx="0">
+            <a:schemeClr val="dk1"/>
+          </a:effectRef>
+          <a:fontRef idx="minor">
+            <a:schemeClr val="tx1"/>
+          </a:fontRef>
+        </p:style>
+      </p:cxnSp>
+      <p:cxnSp>
+        <p:nvCxnSpPr>
+          <p:cNvPr id="6" name="Straight Connector 5">
+            <a:extLst>
+              <a:ext uri="{FF2B5EF4-FFF2-40B4-BE49-F238E27FC236}">
+                <a16:creationId xmlns:a16="http://schemas.microsoft.com/office/drawing/2014/main" id="{01E44379-942F-47AD-AE87-4F13F2F1B57C}"/>
+              </a:ext>
+            </a:extLst>
+          </p:cNvPr>
+          <p:cNvCxnSpPr>
+            <a:cxnSpLocks/>
+          </p:cNvCxnSpPr>
+          <p:nvPr/>
+        </p:nvCxnSpPr>
+        <p:spPr>
+          <a:xfrm flipV="1">
+            <a:off x="828583" y="1525137"/>
+            <a:ext cx="1825633" cy="1740131"/>
+          </a:xfrm>
+          <a:prstGeom prst="line">
+            <a:avLst/>
+          </a:prstGeom>
+        </p:spPr>
+        <p:style>
+          <a:lnRef idx="1">
+            <a:schemeClr val="accent1"/>
+          </a:lnRef>
+          <a:fillRef idx="0">
+            <a:schemeClr val="accent1"/>
+          </a:fillRef>
+          <a:effectRef idx="0">
+            <a:schemeClr val="accent1"/>
+          </a:effectRef>
+          <a:fontRef idx="minor">
+            <a:schemeClr val="tx1"/>
+          </a:fontRef>
+        </p:style>
+      </p:cxnSp>
+      <p:sp>
+        <p:nvSpPr>
+          <p:cNvPr id="7" name="TextBox 6">
+            <a:extLst>
+              <a:ext uri="{FF2B5EF4-FFF2-40B4-BE49-F238E27FC236}">
+                <a16:creationId xmlns:a16="http://schemas.microsoft.com/office/drawing/2014/main" id="{D4CDDB8E-111F-4215-AF91-CFEDE09422FE}"/>
+              </a:ext>
+            </a:extLst>
+          </p:cNvPr>
+          <p:cNvSpPr txBox="1"/>
+          <p:nvPr/>
+        </p:nvSpPr>
+        <p:spPr>
+          <a:xfrm>
+            <a:off x="1661439" y="3300894"/>
+            <a:ext cx="731520" cy="338554"/>
+          </a:xfrm>
+          <a:prstGeom prst="rect">
+            <a:avLst/>
+          </a:prstGeom>
+          <a:noFill/>
+        </p:spPr>
+        <p:txBody>
+          <a:bodyPr wrap="square" rtlCol="0">
+            <a:spAutoFit/>
+          </a:bodyPr>
+          <a:lstStyle/>
+          <a:p>
+            <a:r>
+              <a:rPr lang="en-GB" sz="1600" dirty="0"/>
+              <a:t>Time</a:t>
+            </a:r>
+          </a:p>
+        </p:txBody>
+      </p:sp>
+      <p:sp>
+        <p:nvSpPr>
+          <p:cNvPr id="8" name="TextBox 7">
+            <a:extLst>
+              <a:ext uri="{FF2B5EF4-FFF2-40B4-BE49-F238E27FC236}">
+                <a16:creationId xmlns:a16="http://schemas.microsoft.com/office/drawing/2014/main" id="{0A621FBB-C338-416C-9AC8-9E54844871DF}"/>
+              </a:ext>
+            </a:extLst>
+          </p:cNvPr>
+          <p:cNvSpPr txBox="1"/>
+          <p:nvPr/>
+        </p:nvSpPr>
+        <p:spPr>
+          <a:xfrm>
+            <a:off x="-8703" y="1874658"/>
+            <a:ext cx="1065975" cy="338554"/>
+          </a:xfrm>
+          <a:prstGeom prst="rect">
+            <a:avLst/>
+          </a:prstGeom>
+          <a:noFill/>
+        </p:spPr>
+        <p:txBody>
+          <a:bodyPr wrap="square" rtlCol="0">
+            <a:spAutoFit/>
+          </a:bodyPr>
+          <a:lstStyle/>
+          <a:p>
+            <a:r>
+              <a:rPr lang="en-GB" sz="1600" dirty="0"/>
+              <a:t>Budgets</a:t>
+            </a:r>
+          </a:p>
+        </p:txBody>
+      </p:sp>
+      <p:sp>
+        <p:nvSpPr>
+          <p:cNvPr id="10" name="Arc 9">
+            <a:extLst>
+              <a:ext uri="{FF2B5EF4-FFF2-40B4-BE49-F238E27FC236}">
+                <a16:creationId xmlns:a16="http://schemas.microsoft.com/office/drawing/2014/main" id="{4E95B747-97FF-4262-BD53-70A2E04E54A3}"/>
+              </a:ext>
+            </a:extLst>
+          </p:cNvPr>
+          <p:cNvSpPr/>
+          <p:nvPr/>
+        </p:nvSpPr>
+        <p:spPr>
+          <a:xfrm>
+            <a:off x="-819832" y="1230294"/>
+            <a:ext cx="3296828" cy="2828261"/>
+          </a:xfrm>
+          <a:prstGeom prst="arc">
+            <a:avLst>
+              <a:gd name="adj1" fmla="val 16200000"/>
+              <a:gd name="adj2" fmla="val 1"/>
+            </a:avLst>
+          </a:prstGeom>
+        </p:spPr>
+        <p:style>
+          <a:lnRef idx="1">
+            <a:schemeClr val="accent6"/>
+          </a:lnRef>
+          <a:fillRef idx="0">
+            <a:schemeClr val="accent6"/>
+          </a:fillRef>
+          <a:effectRef idx="0">
+            <a:schemeClr val="accent6"/>
+          </a:effectRef>
+          <a:fontRef idx="minor">
+            <a:schemeClr val="tx1"/>
+          </a:fontRef>
+        </p:style>
+        <p:txBody>
+          <a:bodyPr rtlCol="0" anchor="ctr"/>
+          <a:lstStyle/>
+          <a:p>
+            <a:pPr algn="ctr"/>
+            <a:endParaRPr lang="en-GB"/>
+          </a:p>
+        </p:txBody>
+      </p:sp>
+      <p:sp>
+        <p:nvSpPr>
+          <p:cNvPr id="11" name="TextBox 10">
+            <a:extLst>
+              <a:ext uri="{FF2B5EF4-FFF2-40B4-BE49-F238E27FC236}">
+                <a16:creationId xmlns:a16="http://schemas.microsoft.com/office/drawing/2014/main" id="{48E52224-3336-454F-93D9-CF01856FB000}"/>
+              </a:ext>
+            </a:extLst>
+          </p:cNvPr>
+          <p:cNvSpPr txBox="1"/>
+          <p:nvPr/>
+        </p:nvSpPr>
+        <p:spPr>
+          <a:xfrm>
+            <a:off x="2476996" y="2600741"/>
+            <a:ext cx="953763" cy="276999"/>
+          </a:xfrm>
+          <a:prstGeom prst="rect">
+            <a:avLst/>
+          </a:prstGeom>
+          <a:noFill/>
+        </p:spPr>
+        <p:txBody>
+          <a:bodyPr wrap="square" rtlCol="0">
+            <a:spAutoFit/>
+          </a:bodyPr>
+          <a:lstStyle/>
+          <a:p>
+            <a:r>
+              <a:rPr lang="en-GB" sz="1200" dirty="0"/>
+              <a:t>Manager</a:t>
+            </a:r>
+          </a:p>
+        </p:txBody>
+      </p:sp>
+      <p:sp>
+        <p:nvSpPr>
+          <p:cNvPr id="12" name="TextBox 11">
+            <a:extLst>
+              <a:ext uri="{FF2B5EF4-FFF2-40B4-BE49-F238E27FC236}">
+                <a16:creationId xmlns:a16="http://schemas.microsoft.com/office/drawing/2014/main" id="{F78C0662-CFB4-420C-937B-8AC06E879ED5}"/>
+              </a:ext>
+            </a:extLst>
+          </p:cNvPr>
+          <p:cNvSpPr txBox="1"/>
+          <p:nvPr/>
+        </p:nvSpPr>
+        <p:spPr>
+          <a:xfrm>
+            <a:off x="3629752" y="1318488"/>
+            <a:ext cx="7813067" cy="1292662"/>
+          </a:xfrm>
+          <a:prstGeom prst="rect">
+            <a:avLst/>
+          </a:prstGeom>
+          <a:noFill/>
+        </p:spPr>
+        <p:txBody>
+          <a:bodyPr wrap="square" rtlCol="0">
+            <a:spAutoFit/>
+          </a:bodyPr>
+          <a:lstStyle/>
+          <a:p>
+            <a:r>
+              <a:rPr lang="en-GB" dirty="0"/>
+              <a:t>Scenario 1: large initial investment with decreasing availability of funds over time</a:t>
+            </a:r>
+          </a:p>
+          <a:p>
+            <a:endParaRPr lang="en-GB" dirty="0"/>
+          </a:p>
+          <a:p>
+            <a:r>
+              <a:rPr lang="en-GB" sz="1400" dirty="0"/>
+              <a:t>Example explanation: creation of a new PA, or a single large investment/grant/funding opportunity for a landscape. No further funds are secured in the future, and so manager has a lot of resources to start with, but they are finite</a:t>
+            </a:r>
+          </a:p>
+        </p:txBody>
+      </p:sp>
+      <p:sp>
+        <p:nvSpPr>
+          <p:cNvPr id="13" name="TextBox 12">
+            <a:extLst>
+              <a:ext uri="{FF2B5EF4-FFF2-40B4-BE49-F238E27FC236}">
+                <a16:creationId xmlns:a16="http://schemas.microsoft.com/office/drawing/2014/main" id="{09AE1266-6765-4FE2-9E46-61C7EEFDDB5C}"/>
+              </a:ext>
+            </a:extLst>
+          </p:cNvPr>
+          <p:cNvSpPr txBox="1"/>
+          <p:nvPr/>
+        </p:nvSpPr>
+        <p:spPr>
+          <a:xfrm>
+            <a:off x="3794332" y="85458"/>
+            <a:ext cx="3453787" cy="369332"/>
+          </a:xfrm>
+          <a:prstGeom prst="rect">
+            <a:avLst/>
+          </a:prstGeom>
+          <a:noFill/>
+        </p:spPr>
+        <p:txBody>
+          <a:bodyPr wrap="square" rtlCol="0">
+            <a:spAutoFit/>
+          </a:bodyPr>
+          <a:lstStyle/>
+          <a:p>
+            <a:r>
+              <a:rPr lang="en-GB" b="1" dirty="0"/>
+              <a:t>Single (linear) population scenario</a:t>
+            </a:r>
+          </a:p>
+        </p:txBody>
+      </p:sp>
+      <p:cxnSp>
+        <p:nvCxnSpPr>
+          <p:cNvPr id="14" name="Straight Connector 13">
+            <a:extLst>
+              <a:ext uri="{FF2B5EF4-FFF2-40B4-BE49-F238E27FC236}">
+                <a16:creationId xmlns:a16="http://schemas.microsoft.com/office/drawing/2014/main" id="{22352D64-6811-4DD7-A62B-6BE0A8963835}"/>
+              </a:ext>
+            </a:extLst>
+          </p:cNvPr>
+          <p:cNvCxnSpPr/>
+          <p:nvPr/>
+        </p:nvCxnSpPr>
+        <p:spPr>
+          <a:xfrm>
+            <a:off x="827156" y="3893241"/>
+            <a:ext cx="0" cy="2113808"/>
+          </a:xfrm>
+          <a:prstGeom prst="line">
+            <a:avLst/>
+          </a:prstGeom>
+          <a:ln w="19050"/>
+        </p:spPr>
+        <p:style>
+          <a:lnRef idx="1">
+            <a:schemeClr val="dk1"/>
+          </a:lnRef>
+          <a:fillRef idx="0">
+            <a:schemeClr val="dk1"/>
+          </a:fillRef>
+          <a:effectRef idx="0">
+            <a:schemeClr val="dk1"/>
+          </a:effectRef>
+          <a:fontRef idx="minor">
+            <a:schemeClr val="tx1"/>
+          </a:fontRef>
+        </p:style>
+      </p:cxnSp>
+      <p:cxnSp>
+        <p:nvCxnSpPr>
+          <p:cNvPr id="15" name="Straight Connector 14">
+            <a:extLst>
+              <a:ext uri="{FF2B5EF4-FFF2-40B4-BE49-F238E27FC236}">
+                <a16:creationId xmlns:a16="http://schemas.microsoft.com/office/drawing/2014/main" id="{88F13FDF-7CF9-44E2-9C5D-AE5A8737C210}"/>
+              </a:ext>
+            </a:extLst>
+          </p:cNvPr>
+          <p:cNvCxnSpPr>
+            <a:cxnSpLocks/>
+          </p:cNvCxnSpPr>
+          <p:nvPr/>
+        </p:nvCxnSpPr>
+        <p:spPr>
+          <a:xfrm flipH="1">
+            <a:off x="827156" y="6007049"/>
+            <a:ext cx="2196935" cy="0"/>
+          </a:xfrm>
+          <a:prstGeom prst="line">
+            <a:avLst/>
+          </a:prstGeom>
+          <a:ln w="19050"/>
+        </p:spPr>
+        <p:style>
+          <a:lnRef idx="1">
+            <a:schemeClr val="dk1"/>
+          </a:lnRef>
+          <a:fillRef idx="0">
+            <a:schemeClr val="dk1"/>
+          </a:fillRef>
+          <a:effectRef idx="0">
+            <a:schemeClr val="dk1"/>
+          </a:effectRef>
+          <a:fontRef idx="minor">
+            <a:schemeClr val="tx1"/>
+          </a:fontRef>
+        </p:style>
+      </p:cxnSp>
+      <p:cxnSp>
+        <p:nvCxnSpPr>
+          <p:cNvPr id="16" name="Straight Connector 15">
+            <a:extLst>
+              <a:ext uri="{FF2B5EF4-FFF2-40B4-BE49-F238E27FC236}">
+                <a16:creationId xmlns:a16="http://schemas.microsoft.com/office/drawing/2014/main" id="{02E594E3-1A04-4A09-AF46-B75886B1D4D5}"/>
+              </a:ext>
+            </a:extLst>
+          </p:cNvPr>
+          <p:cNvCxnSpPr>
+            <a:cxnSpLocks/>
+          </p:cNvCxnSpPr>
+          <p:nvPr/>
+        </p:nvCxnSpPr>
+        <p:spPr>
+          <a:xfrm flipV="1">
+            <a:off x="827156" y="3953343"/>
+            <a:ext cx="2196935" cy="2053707"/>
+          </a:xfrm>
+          <a:prstGeom prst="line">
+            <a:avLst/>
+          </a:prstGeom>
+        </p:spPr>
+        <p:style>
+          <a:lnRef idx="1">
+            <a:schemeClr val="accent1"/>
+          </a:lnRef>
+          <a:fillRef idx="0">
+            <a:schemeClr val="accent1"/>
+          </a:fillRef>
+          <a:effectRef idx="0">
+            <a:schemeClr val="accent1"/>
+          </a:effectRef>
+          <a:fontRef idx="minor">
+            <a:schemeClr val="tx1"/>
+          </a:fontRef>
+        </p:style>
+      </p:cxnSp>
+      <p:sp>
+        <p:nvSpPr>
+          <p:cNvPr id="17" name="TextBox 16">
+            <a:extLst>
+              <a:ext uri="{FF2B5EF4-FFF2-40B4-BE49-F238E27FC236}">
+                <a16:creationId xmlns:a16="http://schemas.microsoft.com/office/drawing/2014/main" id="{9C2FB5B9-D8AB-4217-9F0E-62C21AB83571}"/>
+              </a:ext>
+            </a:extLst>
+          </p:cNvPr>
+          <p:cNvSpPr txBox="1"/>
+          <p:nvPr/>
+        </p:nvSpPr>
+        <p:spPr>
+          <a:xfrm>
+            <a:off x="1660012" y="6042675"/>
+            <a:ext cx="731520" cy="338554"/>
+          </a:xfrm>
+          <a:prstGeom prst="rect">
+            <a:avLst/>
+          </a:prstGeom>
+          <a:noFill/>
+        </p:spPr>
+        <p:txBody>
+          <a:bodyPr wrap="square" rtlCol="0">
+            <a:spAutoFit/>
+          </a:bodyPr>
+          <a:lstStyle/>
+          <a:p>
+            <a:r>
+              <a:rPr lang="en-GB" sz="1600" dirty="0"/>
+              <a:t>Time</a:t>
+            </a:r>
+          </a:p>
+        </p:txBody>
+      </p:sp>
+      <p:sp>
+        <p:nvSpPr>
+          <p:cNvPr id="18" name="TextBox 17">
+            <a:extLst>
+              <a:ext uri="{FF2B5EF4-FFF2-40B4-BE49-F238E27FC236}">
+                <a16:creationId xmlns:a16="http://schemas.microsoft.com/office/drawing/2014/main" id="{71DC6715-9C16-4D53-AAB4-C429E276190F}"/>
+              </a:ext>
+            </a:extLst>
+          </p:cNvPr>
+          <p:cNvSpPr txBox="1"/>
+          <p:nvPr/>
+        </p:nvSpPr>
+        <p:spPr>
+          <a:xfrm>
+            <a:off x="-10130" y="4616439"/>
+            <a:ext cx="1065975" cy="338554"/>
+          </a:xfrm>
+          <a:prstGeom prst="rect">
+            <a:avLst/>
+          </a:prstGeom>
+          <a:noFill/>
+        </p:spPr>
+        <p:txBody>
+          <a:bodyPr wrap="square" rtlCol="0">
+            <a:spAutoFit/>
+          </a:bodyPr>
+          <a:lstStyle/>
+          <a:p>
+            <a:r>
+              <a:rPr lang="en-GB" sz="1600" dirty="0"/>
+              <a:t>Budgets</a:t>
+            </a:r>
+          </a:p>
+        </p:txBody>
+      </p:sp>
+      <p:sp>
+        <p:nvSpPr>
+          <p:cNvPr id="24" name="Freeform: Shape 23">
+            <a:extLst>
+              <a:ext uri="{FF2B5EF4-FFF2-40B4-BE49-F238E27FC236}">
+                <a16:creationId xmlns:a16="http://schemas.microsoft.com/office/drawing/2014/main" id="{A0DB3E97-F276-495E-8B6A-DF2B4185C0C9}"/>
+              </a:ext>
+            </a:extLst>
+          </p:cNvPr>
+          <p:cNvSpPr/>
+          <p:nvPr/>
+        </p:nvSpPr>
+        <p:spPr>
+          <a:xfrm>
+            <a:off x="871671" y="3931065"/>
+            <a:ext cx="2076628" cy="2059537"/>
+          </a:xfrm>
+          <a:custGeom>
+            <a:avLst/>
+            <a:gdLst>
+              <a:gd name="connsiteX0" fmla="*/ 0 w 2076628"/>
+              <a:gd name="connsiteY0" fmla="*/ 2059537 h 2059537"/>
+              <a:gd name="connsiteX1" fmla="*/ 1529697 w 2076628"/>
+              <a:gd name="connsiteY1" fmla="*/ 1461331 h 2059537"/>
+              <a:gd name="connsiteX2" fmla="*/ 2076628 w 2076628"/>
+              <a:gd name="connsiteY2" fmla="*/ 0 h 2059537"/>
+              <a:gd name="connsiteX3" fmla="*/ 2076628 w 2076628"/>
+              <a:gd name="connsiteY3" fmla="*/ 0 h 2059537"/>
+            </a:gdLst>
+            <a:ahLst/>
+            <a:cxnLst>
+              <a:cxn ang="0">
+                <a:pos x="connsiteX0" y="connsiteY0"/>
+              </a:cxn>
+              <a:cxn ang="0">
+                <a:pos x="connsiteX1" y="connsiteY1"/>
+              </a:cxn>
+              <a:cxn ang="0">
+                <a:pos x="connsiteX2" y="connsiteY2"/>
+              </a:cxn>
+              <a:cxn ang="0">
+                <a:pos x="connsiteX3" y="connsiteY3"/>
+              </a:cxn>
+            </a:cxnLst>
+            <a:rect l="l" t="t" r="r" b="b"/>
+            <a:pathLst>
+              <a:path w="2076628" h="2059537">
+                <a:moveTo>
+                  <a:pt x="0" y="2059537"/>
+                </a:moveTo>
+                <a:cubicBezTo>
+                  <a:pt x="591796" y="1932062"/>
+                  <a:pt x="1183592" y="1804587"/>
+                  <a:pt x="1529697" y="1461331"/>
+                </a:cubicBezTo>
+                <a:cubicBezTo>
+                  <a:pt x="1875802" y="1118075"/>
+                  <a:pt x="2076628" y="0"/>
+                  <a:pt x="2076628" y="0"/>
+                </a:cubicBezTo>
+                <a:lnTo>
+                  <a:pt x="2076628" y="0"/>
+                </a:lnTo>
+              </a:path>
+            </a:pathLst>
+          </a:custGeom>
+        </p:spPr>
+        <p:style>
+          <a:lnRef idx="1">
+            <a:schemeClr val="accent6"/>
+          </a:lnRef>
+          <a:fillRef idx="0">
+            <a:schemeClr val="accent6"/>
+          </a:fillRef>
+          <a:effectRef idx="0">
+            <a:schemeClr val="accent6"/>
+          </a:effectRef>
+          <a:fontRef idx="minor">
+            <a:schemeClr val="tx1"/>
+          </a:fontRef>
+        </p:style>
+        <p:txBody>
+          <a:bodyPr rtlCol="0" anchor="ctr"/>
+          <a:lstStyle/>
+          <a:p>
+            <a:pPr algn="ctr"/>
+            <a:endParaRPr lang="en-GB"/>
+          </a:p>
+        </p:txBody>
+      </p:sp>
+      <p:sp>
+        <p:nvSpPr>
+          <p:cNvPr id="26" name="TextBox 25">
+            <a:extLst>
+              <a:ext uri="{FF2B5EF4-FFF2-40B4-BE49-F238E27FC236}">
+                <a16:creationId xmlns:a16="http://schemas.microsoft.com/office/drawing/2014/main" id="{57E51D34-5EFF-4260-A84F-50A0AEEC6295}"/>
+              </a:ext>
+            </a:extLst>
+          </p:cNvPr>
+          <p:cNvSpPr txBox="1"/>
+          <p:nvPr/>
+        </p:nvSpPr>
+        <p:spPr>
+          <a:xfrm>
+            <a:off x="3629752" y="4139385"/>
+            <a:ext cx="7813067" cy="1077218"/>
+          </a:xfrm>
+          <a:prstGeom prst="rect">
+            <a:avLst/>
+          </a:prstGeom>
+          <a:noFill/>
+        </p:spPr>
+        <p:txBody>
+          <a:bodyPr wrap="square" rtlCol="0">
+            <a:spAutoFit/>
+          </a:bodyPr>
+          <a:lstStyle/>
+          <a:p>
+            <a:r>
+              <a:rPr lang="en-GB" dirty="0"/>
+              <a:t>Scenario 2: low initial investment with increasing availability of funds over time</a:t>
+            </a:r>
+          </a:p>
+          <a:p>
+            <a:endParaRPr lang="en-GB" dirty="0"/>
+          </a:p>
+          <a:p>
+            <a:r>
+              <a:rPr lang="en-GB" sz="1400" dirty="0"/>
+              <a:t>Example explanation: under-resourced landscape/PA but with increasing fundraising efforts, government investment, or successful sustainable financing mechanisms</a:t>
+            </a:r>
+          </a:p>
+        </p:txBody>
+      </p:sp>
+      <p:sp>
+        <p:nvSpPr>
+          <p:cNvPr id="27" name="TextBox 26">
+            <a:extLst>
+              <a:ext uri="{FF2B5EF4-FFF2-40B4-BE49-F238E27FC236}">
+                <a16:creationId xmlns:a16="http://schemas.microsoft.com/office/drawing/2014/main" id="{5DDB8882-D1DF-40B9-A78F-D86FCD1C10AC}"/>
+              </a:ext>
+            </a:extLst>
+          </p:cNvPr>
+          <p:cNvSpPr txBox="1"/>
+          <p:nvPr/>
+        </p:nvSpPr>
+        <p:spPr>
+          <a:xfrm>
+            <a:off x="2509314" y="5204022"/>
+            <a:ext cx="953763" cy="276999"/>
+          </a:xfrm>
+          <a:prstGeom prst="rect">
+            <a:avLst/>
+          </a:prstGeom>
+          <a:noFill/>
+        </p:spPr>
+        <p:txBody>
+          <a:bodyPr wrap="square" rtlCol="0">
+            <a:spAutoFit/>
+          </a:bodyPr>
+          <a:lstStyle/>
+          <a:p>
+            <a:r>
+              <a:rPr lang="en-GB" sz="1200" dirty="0"/>
+              <a:t>Manager</a:t>
+            </a:r>
+          </a:p>
+        </p:txBody>
+      </p:sp>
+    </p:spTree>
+    <p:extLst>
+      <p:ext uri="{BB962C8B-B14F-4D97-AF65-F5344CB8AC3E}">
+        <p14:creationId xmlns:p14="http://schemas.microsoft.com/office/powerpoint/2010/main" val="957161441"/>
+      </p:ext>
+    </p:extLst>
+  </p:cSld>
+  <p:clrMapOvr>
+    <a:masterClrMapping/>
+  </p:clrMapOvr>
+</p:sld>
+</file>
+
+<file path=ppt/slides/slide4.xml><?xml version="1.0" encoding="utf-8"?>
+<p:sld xmlns:a="http://schemas.openxmlformats.org/drawingml/2006/main" xmlns:r="http://schemas.openxmlformats.org/officeDocument/2006/relationships" xmlns:p="http://schemas.openxmlformats.org/presentationml/2006/main">
+  <p:cSld>
+    <p:spTree>
+      <p:nvGrpSpPr>
+        <p:cNvPr id="1" name=""/>
+        <p:cNvGrpSpPr/>
+        <p:nvPr/>
+      </p:nvGrpSpPr>
+      <p:grpSpPr>
+        <a:xfrm>
+          <a:off x="0" y="0"/>
+          <a:ext cx="0" cy="0"/>
+          <a:chOff x="0" y="0"/>
+          <a:chExt cx="0" cy="0"/>
+        </a:xfrm>
+      </p:grpSpPr>
+      <p:cxnSp>
+        <p:nvCxnSpPr>
+          <p:cNvPr id="4" name="Straight Connector 3">
+            <a:extLst>
+              <a:ext uri="{FF2B5EF4-FFF2-40B4-BE49-F238E27FC236}">
+                <a16:creationId xmlns:a16="http://schemas.microsoft.com/office/drawing/2014/main" id="{9E78AF74-5E14-4DCF-8A71-A90C123DEC09}"/>
+              </a:ext>
+            </a:extLst>
+          </p:cNvPr>
+          <p:cNvCxnSpPr/>
+          <p:nvPr/>
+        </p:nvCxnSpPr>
+        <p:spPr>
+          <a:xfrm>
+            <a:off x="828583" y="1151460"/>
+            <a:ext cx="0" cy="2113808"/>
+          </a:xfrm>
+          <a:prstGeom prst="line">
+            <a:avLst/>
+          </a:prstGeom>
+          <a:ln w="19050"/>
+        </p:spPr>
+        <p:style>
+          <a:lnRef idx="1">
+            <a:schemeClr val="dk1"/>
+          </a:lnRef>
+          <a:fillRef idx="0">
+            <a:schemeClr val="dk1"/>
+          </a:fillRef>
+          <a:effectRef idx="0">
+            <a:schemeClr val="dk1"/>
+          </a:effectRef>
+          <a:fontRef idx="minor">
+            <a:schemeClr val="tx1"/>
+          </a:fontRef>
+        </p:style>
+      </p:cxnSp>
+      <p:cxnSp>
+        <p:nvCxnSpPr>
+          <p:cNvPr id="5" name="Straight Connector 4">
+            <a:extLst>
+              <a:ext uri="{FF2B5EF4-FFF2-40B4-BE49-F238E27FC236}">
+                <a16:creationId xmlns:a16="http://schemas.microsoft.com/office/drawing/2014/main" id="{AA7C92B7-9A2A-4B53-B2EF-32B07472C93D}"/>
+              </a:ext>
+            </a:extLst>
+          </p:cNvPr>
+          <p:cNvCxnSpPr>
+            <a:cxnSpLocks/>
+          </p:cNvCxnSpPr>
+          <p:nvPr/>
+        </p:nvCxnSpPr>
+        <p:spPr>
+          <a:xfrm flipH="1">
+            <a:off x="828583" y="3265268"/>
+            <a:ext cx="2196935" cy="0"/>
+          </a:xfrm>
+          <a:prstGeom prst="line">
+            <a:avLst/>
+          </a:prstGeom>
+          <a:ln w="19050"/>
+        </p:spPr>
+        <p:style>
+          <a:lnRef idx="1">
+            <a:schemeClr val="dk1"/>
+          </a:lnRef>
+          <a:fillRef idx="0">
+            <a:schemeClr val="dk1"/>
+          </a:fillRef>
+          <a:effectRef idx="0">
+            <a:schemeClr val="dk1"/>
+          </a:effectRef>
+          <a:fontRef idx="minor">
+            <a:schemeClr val="tx1"/>
+          </a:fontRef>
+        </p:style>
+      </p:cxnSp>
+      <p:cxnSp>
+        <p:nvCxnSpPr>
+          <p:cNvPr id="6" name="Straight Connector 5">
+            <a:extLst>
+              <a:ext uri="{FF2B5EF4-FFF2-40B4-BE49-F238E27FC236}">
+                <a16:creationId xmlns:a16="http://schemas.microsoft.com/office/drawing/2014/main" id="{CEE586C0-B4B0-407A-A404-14A8C21570FD}"/>
+              </a:ext>
+            </a:extLst>
+          </p:cNvPr>
+          <p:cNvCxnSpPr>
+            <a:cxnSpLocks/>
+          </p:cNvCxnSpPr>
+          <p:nvPr/>
+        </p:nvCxnSpPr>
+        <p:spPr>
+          <a:xfrm flipV="1">
+            <a:off x="828583" y="1525137"/>
+            <a:ext cx="1825633" cy="1740131"/>
+          </a:xfrm>
+          <a:prstGeom prst="line">
+            <a:avLst/>
+          </a:prstGeom>
+        </p:spPr>
+        <p:style>
+          <a:lnRef idx="1">
+            <a:schemeClr val="accent1"/>
+          </a:lnRef>
+          <a:fillRef idx="0">
+            <a:schemeClr val="accent1"/>
+          </a:fillRef>
+          <a:effectRef idx="0">
+            <a:schemeClr val="accent1"/>
+          </a:effectRef>
+          <a:fontRef idx="minor">
+            <a:schemeClr val="tx1"/>
+          </a:fontRef>
+        </p:style>
+      </p:cxnSp>
+      <p:sp>
+        <p:nvSpPr>
+          <p:cNvPr id="7" name="TextBox 6">
+            <a:extLst>
+              <a:ext uri="{FF2B5EF4-FFF2-40B4-BE49-F238E27FC236}">
+                <a16:creationId xmlns:a16="http://schemas.microsoft.com/office/drawing/2014/main" id="{9A4ABAF4-73E6-4999-AD5B-13AEEAA2E3F6}"/>
+              </a:ext>
+            </a:extLst>
+          </p:cNvPr>
+          <p:cNvSpPr txBox="1"/>
+          <p:nvPr/>
+        </p:nvSpPr>
+        <p:spPr>
+          <a:xfrm>
+            <a:off x="1661439" y="3300894"/>
+            <a:ext cx="731520" cy="338554"/>
+          </a:xfrm>
+          <a:prstGeom prst="rect">
+            <a:avLst/>
+          </a:prstGeom>
+          <a:noFill/>
+        </p:spPr>
+        <p:txBody>
+          <a:bodyPr wrap="square" rtlCol="0">
+            <a:spAutoFit/>
+          </a:bodyPr>
+          <a:lstStyle/>
+          <a:p>
+            <a:r>
+              <a:rPr lang="en-GB" sz="1600" dirty="0"/>
+              <a:t>Time</a:t>
+            </a:r>
+          </a:p>
+        </p:txBody>
+      </p:sp>
+      <p:sp>
+        <p:nvSpPr>
+          <p:cNvPr id="8" name="TextBox 7">
+            <a:extLst>
+              <a:ext uri="{FF2B5EF4-FFF2-40B4-BE49-F238E27FC236}">
+                <a16:creationId xmlns:a16="http://schemas.microsoft.com/office/drawing/2014/main" id="{E3141EE2-0753-496D-89A8-DFC8053ED528}"/>
+              </a:ext>
+            </a:extLst>
+          </p:cNvPr>
+          <p:cNvSpPr txBox="1"/>
+          <p:nvPr/>
+        </p:nvSpPr>
+        <p:spPr>
+          <a:xfrm>
+            <a:off x="-8703" y="1874658"/>
+            <a:ext cx="1065975" cy="338554"/>
+          </a:xfrm>
+          <a:prstGeom prst="rect">
+            <a:avLst/>
+          </a:prstGeom>
+          <a:noFill/>
+        </p:spPr>
+        <p:txBody>
+          <a:bodyPr wrap="square" rtlCol="0">
+            <a:spAutoFit/>
+          </a:bodyPr>
+          <a:lstStyle/>
+          <a:p>
+            <a:r>
+              <a:rPr lang="en-GB" sz="1600" dirty="0"/>
+              <a:t>Budgets</a:t>
+            </a:r>
+          </a:p>
+        </p:txBody>
+      </p:sp>
+      <p:sp>
+        <p:nvSpPr>
+          <p:cNvPr id="9" name="TextBox 8">
+            <a:extLst>
+              <a:ext uri="{FF2B5EF4-FFF2-40B4-BE49-F238E27FC236}">
+                <a16:creationId xmlns:a16="http://schemas.microsoft.com/office/drawing/2014/main" id="{5E5C4A68-2D05-4A6F-8E61-1B4F6BA0CA6F}"/>
+              </a:ext>
+            </a:extLst>
+          </p:cNvPr>
+          <p:cNvSpPr txBox="1"/>
+          <p:nvPr/>
+        </p:nvSpPr>
+        <p:spPr>
+          <a:xfrm>
+            <a:off x="3629752" y="1318488"/>
+            <a:ext cx="7813067" cy="1077218"/>
+          </a:xfrm>
+          <a:prstGeom prst="rect">
+            <a:avLst/>
+          </a:prstGeom>
+          <a:noFill/>
+        </p:spPr>
+        <p:txBody>
+          <a:bodyPr wrap="square" rtlCol="0">
+            <a:spAutoFit/>
+          </a:bodyPr>
+          <a:lstStyle/>
+          <a:p>
+            <a:r>
+              <a:rPr lang="en-GB" dirty="0"/>
+              <a:t>Scenario 3: Interval investment (no overall increase)</a:t>
+            </a:r>
+          </a:p>
+          <a:p>
+            <a:r>
+              <a:rPr lang="en-GB" dirty="0"/>
+              <a:t> </a:t>
+            </a:r>
+          </a:p>
+          <a:p>
+            <a:r>
+              <a:rPr lang="en-GB" sz="1400" dirty="0"/>
+              <a:t>Example explanation: Manager’s budget subject to funding/grant cycles, but unable to permanently increase budget</a:t>
+            </a:r>
+          </a:p>
+        </p:txBody>
+      </p:sp>
+      <p:sp>
+        <p:nvSpPr>
+          <p:cNvPr id="10" name="TextBox 9">
+            <a:extLst>
+              <a:ext uri="{FF2B5EF4-FFF2-40B4-BE49-F238E27FC236}">
+                <a16:creationId xmlns:a16="http://schemas.microsoft.com/office/drawing/2014/main" id="{C6ACFE24-F61C-48AF-8C01-CF8B076B1B73}"/>
+              </a:ext>
+            </a:extLst>
+          </p:cNvPr>
+          <p:cNvSpPr txBox="1"/>
+          <p:nvPr/>
+        </p:nvSpPr>
+        <p:spPr>
+          <a:xfrm>
+            <a:off x="3794332" y="85458"/>
+            <a:ext cx="3453787" cy="369332"/>
+          </a:xfrm>
+          <a:prstGeom prst="rect">
+            <a:avLst/>
+          </a:prstGeom>
+          <a:noFill/>
+        </p:spPr>
+        <p:txBody>
+          <a:bodyPr wrap="square" rtlCol="0">
+            <a:spAutoFit/>
+          </a:bodyPr>
+          <a:lstStyle/>
+          <a:p>
+            <a:r>
+              <a:rPr lang="en-GB" b="1" dirty="0"/>
+              <a:t>Single (linear) population scenario</a:t>
+            </a:r>
+          </a:p>
+        </p:txBody>
+      </p:sp>
+      <p:sp>
+        <p:nvSpPr>
+          <p:cNvPr id="11" name="Freeform: Shape 10">
+            <a:extLst>
+              <a:ext uri="{FF2B5EF4-FFF2-40B4-BE49-F238E27FC236}">
+                <a16:creationId xmlns:a16="http://schemas.microsoft.com/office/drawing/2014/main" id="{8ACEA50F-19F5-4A2D-8337-148AA237E3D0}"/>
+              </a:ext>
+            </a:extLst>
+          </p:cNvPr>
+          <p:cNvSpPr/>
+          <p:nvPr/>
+        </p:nvSpPr>
+        <p:spPr>
+          <a:xfrm>
+            <a:off x="863098" y="2043935"/>
+            <a:ext cx="2127903" cy="307649"/>
+          </a:xfrm>
+          <a:custGeom>
+            <a:avLst/>
+            <a:gdLst>
+              <a:gd name="connsiteX0" fmla="*/ 0 w 2127903"/>
+              <a:gd name="connsiteY0" fmla="*/ 307649 h 307649"/>
+              <a:gd name="connsiteX1" fmla="*/ 213645 w 2127903"/>
+              <a:gd name="connsiteY1" fmla="*/ 94004 h 307649"/>
+              <a:gd name="connsiteX2" fmla="*/ 546931 w 2127903"/>
+              <a:gd name="connsiteY2" fmla="*/ 273466 h 307649"/>
+              <a:gd name="connsiteX3" fmla="*/ 854580 w 2127903"/>
+              <a:gd name="connsiteY3" fmla="*/ 68367 h 307649"/>
+              <a:gd name="connsiteX4" fmla="*/ 1162228 w 2127903"/>
+              <a:gd name="connsiteY4" fmla="*/ 256374 h 307649"/>
+              <a:gd name="connsiteX5" fmla="*/ 1521152 w 2127903"/>
+              <a:gd name="connsiteY5" fmla="*/ 76913 h 307649"/>
+              <a:gd name="connsiteX6" fmla="*/ 1811709 w 2127903"/>
+              <a:gd name="connsiteY6" fmla="*/ 230737 h 307649"/>
+              <a:gd name="connsiteX7" fmla="*/ 2127903 w 2127903"/>
+              <a:gd name="connsiteY7" fmla="*/ 0 h 307649"/>
+            </a:gdLst>
+            <a:ahLst/>
+            <a:cxnLst>
+              <a:cxn ang="0">
+                <a:pos x="connsiteX0" y="connsiteY0"/>
+              </a:cxn>
+              <a:cxn ang="0">
+                <a:pos x="connsiteX1" y="connsiteY1"/>
+              </a:cxn>
+              <a:cxn ang="0">
+                <a:pos x="connsiteX2" y="connsiteY2"/>
+              </a:cxn>
+              <a:cxn ang="0">
+                <a:pos x="connsiteX3" y="connsiteY3"/>
+              </a:cxn>
+              <a:cxn ang="0">
+                <a:pos x="connsiteX4" y="connsiteY4"/>
+              </a:cxn>
+              <a:cxn ang="0">
+                <a:pos x="connsiteX5" y="connsiteY5"/>
+              </a:cxn>
+              <a:cxn ang="0">
+                <a:pos x="connsiteX6" y="connsiteY6"/>
+              </a:cxn>
+              <a:cxn ang="0">
+                <a:pos x="connsiteX7" y="connsiteY7"/>
+              </a:cxn>
+            </a:cxnLst>
+            <a:rect l="l" t="t" r="r" b="b"/>
+            <a:pathLst>
+              <a:path w="2127903" h="307649">
+                <a:moveTo>
+                  <a:pt x="0" y="307649"/>
+                </a:moveTo>
+                <a:cubicBezTo>
+                  <a:pt x="61245" y="203675"/>
+                  <a:pt x="122490" y="99701"/>
+                  <a:pt x="213645" y="94004"/>
+                </a:cubicBezTo>
+                <a:cubicBezTo>
+                  <a:pt x="304800" y="88307"/>
+                  <a:pt x="440109" y="277739"/>
+                  <a:pt x="546931" y="273466"/>
+                </a:cubicBezTo>
+                <a:cubicBezTo>
+                  <a:pt x="653753" y="269193"/>
+                  <a:pt x="752031" y="71216"/>
+                  <a:pt x="854580" y="68367"/>
+                </a:cubicBezTo>
+                <a:cubicBezTo>
+                  <a:pt x="957129" y="65518"/>
+                  <a:pt x="1051133" y="254950"/>
+                  <a:pt x="1162228" y="256374"/>
+                </a:cubicBezTo>
+                <a:cubicBezTo>
+                  <a:pt x="1273323" y="257798"/>
+                  <a:pt x="1412905" y="81186"/>
+                  <a:pt x="1521152" y="76913"/>
+                </a:cubicBezTo>
+                <a:cubicBezTo>
+                  <a:pt x="1629399" y="72640"/>
+                  <a:pt x="1710584" y="243556"/>
+                  <a:pt x="1811709" y="230737"/>
+                </a:cubicBezTo>
+                <a:cubicBezTo>
+                  <a:pt x="1912834" y="217918"/>
+                  <a:pt x="2020368" y="108959"/>
+                  <a:pt x="2127903" y="0"/>
+                </a:cubicBezTo>
+              </a:path>
+            </a:pathLst>
+          </a:custGeom>
+        </p:spPr>
+        <p:style>
+          <a:lnRef idx="1">
+            <a:schemeClr val="accent6"/>
+          </a:lnRef>
+          <a:fillRef idx="0">
+            <a:schemeClr val="accent6"/>
+          </a:fillRef>
+          <a:effectRef idx="0">
+            <a:schemeClr val="accent6"/>
+          </a:effectRef>
+          <a:fontRef idx="minor">
+            <a:schemeClr val="tx1"/>
+          </a:fontRef>
+        </p:style>
+        <p:txBody>
+          <a:bodyPr rtlCol="0" anchor="ctr"/>
+          <a:lstStyle/>
+          <a:p>
+            <a:pPr algn="ctr"/>
+            <a:endParaRPr lang="en-GB"/>
+          </a:p>
+        </p:txBody>
+      </p:sp>
+      <p:cxnSp>
+        <p:nvCxnSpPr>
+          <p:cNvPr id="12" name="Straight Connector 11">
+            <a:extLst>
+              <a:ext uri="{FF2B5EF4-FFF2-40B4-BE49-F238E27FC236}">
+                <a16:creationId xmlns:a16="http://schemas.microsoft.com/office/drawing/2014/main" id="{13CD1CCC-8D4D-4B28-B55B-9B98BE7FAE8D}"/>
+              </a:ext>
+            </a:extLst>
+          </p:cNvPr>
+          <p:cNvCxnSpPr/>
+          <p:nvPr/>
+        </p:nvCxnSpPr>
+        <p:spPr>
+          <a:xfrm>
+            <a:off x="827157" y="4004335"/>
+            <a:ext cx="0" cy="2113808"/>
+          </a:xfrm>
+          <a:prstGeom prst="line">
+            <a:avLst/>
+          </a:prstGeom>
+          <a:ln w="19050"/>
+        </p:spPr>
+        <p:style>
+          <a:lnRef idx="1">
+            <a:schemeClr val="dk1"/>
+          </a:lnRef>
+          <a:fillRef idx="0">
+            <a:schemeClr val="dk1"/>
+          </a:fillRef>
+          <a:effectRef idx="0">
+            <a:schemeClr val="dk1"/>
+          </a:effectRef>
+          <a:fontRef idx="minor">
+            <a:schemeClr val="tx1"/>
+          </a:fontRef>
+        </p:style>
+      </p:cxnSp>
+      <p:cxnSp>
+        <p:nvCxnSpPr>
+          <p:cNvPr id="13" name="Straight Connector 12">
+            <a:extLst>
+              <a:ext uri="{FF2B5EF4-FFF2-40B4-BE49-F238E27FC236}">
+                <a16:creationId xmlns:a16="http://schemas.microsoft.com/office/drawing/2014/main" id="{42154637-D5A3-457A-9C51-5EB29B397B3F}"/>
+              </a:ext>
+            </a:extLst>
+          </p:cNvPr>
+          <p:cNvCxnSpPr>
+            <a:cxnSpLocks/>
+          </p:cNvCxnSpPr>
+          <p:nvPr/>
+        </p:nvCxnSpPr>
+        <p:spPr>
+          <a:xfrm flipH="1">
+            <a:off x="827157" y="6118143"/>
+            <a:ext cx="2196935" cy="0"/>
+          </a:xfrm>
+          <a:prstGeom prst="line">
+            <a:avLst/>
+          </a:prstGeom>
+          <a:ln w="19050"/>
+        </p:spPr>
+        <p:style>
+          <a:lnRef idx="1">
+            <a:schemeClr val="dk1"/>
+          </a:lnRef>
+          <a:fillRef idx="0">
+            <a:schemeClr val="dk1"/>
+          </a:fillRef>
+          <a:effectRef idx="0">
+            <a:schemeClr val="dk1"/>
+          </a:effectRef>
+          <a:fontRef idx="minor">
+            <a:schemeClr val="tx1"/>
+          </a:fontRef>
+        </p:style>
+      </p:cxnSp>
+      <p:cxnSp>
+        <p:nvCxnSpPr>
+          <p:cNvPr id="14" name="Straight Connector 13">
+            <a:extLst>
+              <a:ext uri="{FF2B5EF4-FFF2-40B4-BE49-F238E27FC236}">
+                <a16:creationId xmlns:a16="http://schemas.microsoft.com/office/drawing/2014/main" id="{1D30C2E9-FD27-46B3-90C1-F3FDDAF946BF}"/>
+              </a:ext>
+            </a:extLst>
+          </p:cNvPr>
+          <p:cNvCxnSpPr>
+            <a:cxnSpLocks/>
+          </p:cNvCxnSpPr>
+          <p:nvPr/>
+        </p:nvCxnSpPr>
+        <p:spPr>
+          <a:xfrm flipV="1">
+            <a:off x="827157" y="4378012"/>
+            <a:ext cx="1825633" cy="1740131"/>
+          </a:xfrm>
+          <a:prstGeom prst="line">
+            <a:avLst/>
+          </a:prstGeom>
+        </p:spPr>
+        <p:style>
+          <a:lnRef idx="1">
+            <a:schemeClr val="accent1"/>
+          </a:lnRef>
+          <a:fillRef idx="0">
+            <a:schemeClr val="accent1"/>
+          </a:fillRef>
+          <a:effectRef idx="0">
+            <a:schemeClr val="accent1"/>
+          </a:effectRef>
+          <a:fontRef idx="minor">
+            <a:schemeClr val="tx1"/>
+          </a:fontRef>
+        </p:style>
+      </p:cxnSp>
+      <p:sp>
+        <p:nvSpPr>
+          <p:cNvPr id="15" name="TextBox 14">
+            <a:extLst>
+              <a:ext uri="{FF2B5EF4-FFF2-40B4-BE49-F238E27FC236}">
+                <a16:creationId xmlns:a16="http://schemas.microsoft.com/office/drawing/2014/main" id="{33846330-04EA-4A07-91DB-CDDF09C4B11E}"/>
+              </a:ext>
+            </a:extLst>
+          </p:cNvPr>
+          <p:cNvSpPr txBox="1"/>
+          <p:nvPr/>
+        </p:nvSpPr>
+        <p:spPr>
+          <a:xfrm>
+            <a:off x="1660013" y="6153769"/>
+            <a:ext cx="731520" cy="338554"/>
+          </a:xfrm>
+          <a:prstGeom prst="rect">
+            <a:avLst/>
+          </a:prstGeom>
+          <a:noFill/>
+        </p:spPr>
+        <p:txBody>
+          <a:bodyPr wrap="square" rtlCol="0">
+            <a:spAutoFit/>
+          </a:bodyPr>
+          <a:lstStyle/>
+          <a:p>
+            <a:r>
+              <a:rPr lang="en-GB" sz="1600" dirty="0"/>
+              <a:t>Time</a:t>
+            </a:r>
+          </a:p>
+        </p:txBody>
+      </p:sp>
+      <p:sp>
+        <p:nvSpPr>
+          <p:cNvPr id="16" name="TextBox 15">
+            <a:extLst>
+              <a:ext uri="{FF2B5EF4-FFF2-40B4-BE49-F238E27FC236}">
+                <a16:creationId xmlns:a16="http://schemas.microsoft.com/office/drawing/2014/main" id="{7DEB53FD-964E-400B-8FB3-9AD5635AF954}"/>
+              </a:ext>
+            </a:extLst>
+          </p:cNvPr>
+          <p:cNvSpPr txBox="1"/>
+          <p:nvPr/>
+        </p:nvSpPr>
+        <p:spPr>
+          <a:xfrm>
+            <a:off x="-10129" y="4727533"/>
+            <a:ext cx="1065975" cy="338554"/>
+          </a:xfrm>
+          <a:prstGeom prst="rect">
+            <a:avLst/>
+          </a:prstGeom>
+          <a:noFill/>
+        </p:spPr>
+        <p:txBody>
+          <a:bodyPr wrap="square" rtlCol="0">
+            <a:spAutoFit/>
+          </a:bodyPr>
+          <a:lstStyle/>
+          <a:p>
+            <a:r>
+              <a:rPr lang="en-GB" sz="1600" dirty="0"/>
+              <a:t>Budgets</a:t>
+            </a:r>
+          </a:p>
+        </p:txBody>
+      </p:sp>
+      <p:sp>
+        <p:nvSpPr>
+          <p:cNvPr id="18" name="Freeform: Shape 17">
+            <a:extLst>
+              <a:ext uri="{FF2B5EF4-FFF2-40B4-BE49-F238E27FC236}">
+                <a16:creationId xmlns:a16="http://schemas.microsoft.com/office/drawing/2014/main" id="{AEFF909D-D23E-4462-9AC5-0F5EF9353780}"/>
+              </a:ext>
+            </a:extLst>
+          </p:cNvPr>
+          <p:cNvSpPr/>
+          <p:nvPr/>
+        </p:nvSpPr>
+        <p:spPr>
+          <a:xfrm>
+            <a:off x="839000" y="4383993"/>
+            <a:ext cx="2211849" cy="1709158"/>
+          </a:xfrm>
+          <a:custGeom>
+            <a:avLst/>
+            <a:gdLst>
+              <a:gd name="connsiteX0" fmla="*/ 15579 w 2211849"/>
+              <a:gd name="connsiteY0" fmla="*/ 1709158 h 1709158"/>
+              <a:gd name="connsiteX1" fmla="*/ 126675 w 2211849"/>
+              <a:gd name="connsiteY1" fmla="*/ 1256231 h 1709158"/>
+              <a:gd name="connsiteX2" fmla="*/ 947071 w 2211849"/>
+              <a:gd name="connsiteY2" fmla="*/ 1196411 h 1709158"/>
+              <a:gd name="connsiteX3" fmla="*/ 1058166 w 2211849"/>
+              <a:gd name="connsiteY3" fmla="*/ 316194 h 1709158"/>
+              <a:gd name="connsiteX4" fmla="*/ 1972566 w 2211849"/>
+              <a:gd name="connsiteY4" fmla="*/ 170915 h 1709158"/>
+              <a:gd name="connsiteX5" fmla="*/ 2211849 w 2211849"/>
+              <a:gd name="connsiteY5" fmla="*/ 0 h 1709158"/>
+            </a:gdLst>
+            <a:ahLst/>
+            <a:cxnLst>
+              <a:cxn ang="0">
+                <a:pos x="connsiteX0" y="connsiteY0"/>
+              </a:cxn>
+              <a:cxn ang="0">
+                <a:pos x="connsiteX1" y="connsiteY1"/>
+              </a:cxn>
+              <a:cxn ang="0">
+                <a:pos x="connsiteX2" y="connsiteY2"/>
+              </a:cxn>
+              <a:cxn ang="0">
+                <a:pos x="connsiteX3" y="connsiteY3"/>
+              </a:cxn>
+              <a:cxn ang="0">
+                <a:pos x="connsiteX4" y="connsiteY4"/>
+              </a:cxn>
+              <a:cxn ang="0">
+                <a:pos x="connsiteX5" y="connsiteY5"/>
+              </a:cxn>
+            </a:cxnLst>
+            <a:rect l="l" t="t" r="r" b="b"/>
+            <a:pathLst>
+              <a:path w="2211849" h="1709158">
+                <a:moveTo>
+                  <a:pt x="15579" y="1709158"/>
+                </a:moveTo>
+                <a:cubicBezTo>
+                  <a:pt x="-6498" y="1525423"/>
+                  <a:pt x="-28574" y="1341689"/>
+                  <a:pt x="126675" y="1256231"/>
+                </a:cubicBezTo>
+                <a:cubicBezTo>
+                  <a:pt x="281924" y="1170773"/>
+                  <a:pt x="791823" y="1353084"/>
+                  <a:pt x="947071" y="1196411"/>
+                </a:cubicBezTo>
+                <a:cubicBezTo>
+                  <a:pt x="1102320" y="1039738"/>
+                  <a:pt x="887250" y="487110"/>
+                  <a:pt x="1058166" y="316194"/>
+                </a:cubicBezTo>
+                <a:cubicBezTo>
+                  <a:pt x="1229082" y="145278"/>
+                  <a:pt x="1780285" y="223614"/>
+                  <a:pt x="1972566" y="170915"/>
+                </a:cubicBezTo>
+                <a:cubicBezTo>
+                  <a:pt x="2164847" y="118216"/>
+                  <a:pt x="2188348" y="59108"/>
+                  <a:pt x="2211849" y="0"/>
+                </a:cubicBezTo>
+              </a:path>
+            </a:pathLst>
+          </a:custGeom>
+        </p:spPr>
+        <p:style>
+          <a:lnRef idx="1">
+            <a:schemeClr val="accent6"/>
+          </a:lnRef>
+          <a:fillRef idx="0">
+            <a:schemeClr val="accent6"/>
+          </a:fillRef>
+          <a:effectRef idx="0">
+            <a:schemeClr val="accent6"/>
+          </a:effectRef>
+          <a:fontRef idx="minor">
+            <a:schemeClr val="tx1"/>
+          </a:fontRef>
+        </p:style>
+        <p:txBody>
+          <a:bodyPr rtlCol="0" anchor="ctr"/>
+          <a:lstStyle/>
+          <a:p>
+            <a:pPr algn="ctr"/>
+            <a:endParaRPr lang="en-GB"/>
+          </a:p>
+        </p:txBody>
+      </p:sp>
+      <p:sp>
+        <p:nvSpPr>
+          <p:cNvPr id="19" name="TextBox 18">
+            <a:extLst>
+              <a:ext uri="{FF2B5EF4-FFF2-40B4-BE49-F238E27FC236}">
+                <a16:creationId xmlns:a16="http://schemas.microsoft.com/office/drawing/2014/main" id="{E323C445-90F4-45B8-B997-D13439A55C97}"/>
+              </a:ext>
+            </a:extLst>
+          </p:cNvPr>
+          <p:cNvSpPr txBox="1"/>
+          <p:nvPr/>
+        </p:nvSpPr>
+        <p:spPr>
+          <a:xfrm>
+            <a:off x="3629752" y="4522630"/>
+            <a:ext cx="7813067" cy="1077218"/>
+          </a:xfrm>
+          <a:prstGeom prst="rect">
+            <a:avLst/>
+          </a:prstGeom>
+          <a:noFill/>
+        </p:spPr>
+        <p:txBody>
+          <a:bodyPr wrap="square" rtlCol="0">
+            <a:spAutoFit/>
+          </a:bodyPr>
+          <a:lstStyle/>
+          <a:p>
+            <a:r>
+              <a:rPr lang="en-GB" dirty="0"/>
+              <a:t>Scenario 4: Interval investment (overall increase)</a:t>
+            </a:r>
+          </a:p>
+          <a:p>
+            <a:r>
+              <a:rPr lang="en-GB" dirty="0"/>
+              <a:t> </a:t>
+            </a:r>
+          </a:p>
+          <a:p>
+            <a:r>
+              <a:rPr lang="en-GB" sz="1400" dirty="0"/>
+              <a:t>Example explanation: Manager’s budget subject to funding/grant cycles, but able to permanently increase budget</a:t>
+            </a:r>
+          </a:p>
+        </p:txBody>
+      </p:sp>
+      <p:sp>
+        <p:nvSpPr>
+          <p:cNvPr id="20" name="TextBox 19">
+            <a:extLst>
+              <a:ext uri="{FF2B5EF4-FFF2-40B4-BE49-F238E27FC236}">
+                <a16:creationId xmlns:a16="http://schemas.microsoft.com/office/drawing/2014/main" id="{C026475D-59BD-43C1-AFD0-499E5DAA7330}"/>
+              </a:ext>
+            </a:extLst>
+          </p:cNvPr>
+          <p:cNvSpPr txBox="1"/>
+          <p:nvPr/>
+        </p:nvSpPr>
+        <p:spPr>
+          <a:xfrm>
+            <a:off x="2391533" y="2256702"/>
+            <a:ext cx="953763" cy="276999"/>
+          </a:xfrm>
+          <a:prstGeom prst="rect">
+            <a:avLst/>
+          </a:prstGeom>
+          <a:noFill/>
+        </p:spPr>
+        <p:txBody>
+          <a:bodyPr wrap="square" rtlCol="0">
+            <a:spAutoFit/>
+          </a:bodyPr>
+          <a:lstStyle/>
+          <a:p>
+            <a:r>
+              <a:rPr lang="en-GB" sz="1200" dirty="0"/>
+              <a:t>Manager</a:t>
+            </a:r>
+          </a:p>
+        </p:txBody>
+      </p:sp>
+      <p:sp>
+        <p:nvSpPr>
+          <p:cNvPr id="21" name="TextBox 20">
+            <a:extLst>
+              <a:ext uri="{FF2B5EF4-FFF2-40B4-BE49-F238E27FC236}">
+                <a16:creationId xmlns:a16="http://schemas.microsoft.com/office/drawing/2014/main" id="{C62B247E-8AB2-41ED-ABD3-80E367215A4C}"/>
+              </a:ext>
+            </a:extLst>
+          </p:cNvPr>
+          <p:cNvSpPr txBox="1"/>
+          <p:nvPr/>
+        </p:nvSpPr>
+        <p:spPr>
+          <a:xfrm>
+            <a:off x="2868414" y="4117257"/>
+            <a:ext cx="953763" cy="276999"/>
+          </a:xfrm>
+          <a:prstGeom prst="rect">
+            <a:avLst/>
+          </a:prstGeom>
+          <a:noFill/>
+        </p:spPr>
+        <p:txBody>
+          <a:bodyPr wrap="square" rtlCol="0">
+            <a:spAutoFit/>
+          </a:bodyPr>
+          <a:lstStyle/>
+          <a:p>
+            <a:r>
+              <a:rPr lang="en-GB" sz="1200" dirty="0"/>
+              <a:t>Manager</a:t>
+            </a:r>
+          </a:p>
+        </p:txBody>
+      </p:sp>
+    </p:spTree>
+    <p:extLst>
+      <p:ext uri="{BB962C8B-B14F-4D97-AF65-F5344CB8AC3E}">
+        <p14:creationId xmlns:p14="http://schemas.microsoft.com/office/powerpoint/2010/main" val="3299060376"/>
+      </p:ext>
+    </p:extLst>
+  </p:cSld>
+  <p:clrMapOvr>
+    <a:masterClrMapping/>
+  </p:clrMapOvr>
+</p:sld>
+</file>
+
+<file path=ppt/slides/slide5.xml><?xml version="1.0" encoding="utf-8"?>
+<p:sld xmlns:a="http://schemas.openxmlformats.org/drawingml/2006/main" xmlns:r="http://schemas.openxmlformats.org/officeDocument/2006/relationships" xmlns:p="http://schemas.openxmlformats.org/presentationml/2006/main">
+  <p:cSld>
+    <p:spTree>
+      <p:nvGrpSpPr>
+        <p:cNvPr id="1" name=""/>
+        <p:cNvGrpSpPr/>
+        <p:nvPr/>
+      </p:nvGrpSpPr>
+      <p:grpSpPr>
+        <a:xfrm>
+          <a:off x="0" y="0"/>
+          <a:ext cx="0" cy="0"/>
+          <a:chOff x="0" y="0"/>
+          <a:chExt cx="0" cy="0"/>
+        </a:xfrm>
+      </p:grpSpPr>
+      <p:cxnSp>
+        <p:nvCxnSpPr>
+          <p:cNvPr id="4" name="Straight Connector 3">
+            <a:extLst>
+              <a:ext uri="{FF2B5EF4-FFF2-40B4-BE49-F238E27FC236}">
+                <a16:creationId xmlns:a16="http://schemas.microsoft.com/office/drawing/2014/main" id="{9E78AF74-5E14-4DCF-8A71-A90C123DEC09}"/>
+              </a:ext>
+            </a:extLst>
+          </p:cNvPr>
+          <p:cNvCxnSpPr/>
+          <p:nvPr/>
+        </p:nvCxnSpPr>
+        <p:spPr>
+          <a:xfrm>
+            <a:off x="828583" y="1151460"/>
+            <a:ext cx="0" cy="2113808"/>
+          </a:xfrm>
+          <a:prstGeom prst="line">
+            <a:avLst/>
+          </a:prstGeom>
+          <a:ln w="19050"/>
+        </p:spPr>
+        <p:style>
+          <a:lnRef idx="1">
+            <a:schemeClr val="dk1"/>
+          </a:lnRef>
+          <a:fillRef idx="0">
+            <a:schemeClr val="dk1"/>
+          </a:fillRef>
+          <a:effectRef idx="0">
+            <a:schemeClr val="dk1"/>
+          </a:effectRef>
+          <a:fontRef idx="minor">
+            <a:schemeClr val="tx1"/>
+          </a:fontRef>
+        </p:style>
+      </p:cxnSp>
+      <p:cxnSp>
+        <p:nvCxnSpPr>
+          <p:cNvPr id="5" name="Straight Connector 4">
+            <a:extLst>
+              <a:ext uri="{FF2B5EF4-FFF2-40B4-BE49-F238E27FC236}">
+                <a16:creationId xmlns:a16="http://schemas.microsoft.com/office/drawing/2014/main" id="{AA7C92B7-9A2A-4B53-B2EF-32B07472C93D}"/>
+              </a:ext>
+            </a:extLst>
+          </p:cNvPr>
+          <p:cNvCxnSpPr>
+            <a:cxnSpLocks/>
+          </p:cNvCxnSpPr>
+          <p:nvPr/>
+        </p:nvCxnSpPr>
+        <p:spPr>
+          <a:xfrm flipH="1">
+            <a:off x="828583" y="3265268"/>
+            <a:ext cx="2196935" cy="0"/>
+          </a:xfrm>
+          <a:prstGeom prst="line">
+            <a:avLst/>
+          </a:prstGeom>
+          <a:ln w="19050"/>
+        </p:spPr>
+        <p:style>
+          <a:lnRef idx="1">
+            <a:schemeClr val="dk1"/>
+          </a:lnRef>
+          <a:fillRef idx="0">
+            <a:schemeClr val="dk1"/>
+          </a:fillRef>
+          <a:effectRef idx="0">
+            <a:schemeClr val="dk1"/>
+          </a:effectRef>
+          <a:fontRef idx="minor">
+            <a:schemeClr val="tx1"/>
+          </a:fontRef>
+        </p:style>
+      </p:cxnSp>
+      <p:sp>
+        <p:nvSpPr>
+          <p:cNvPr id="7" name="TextBox 6">
+            <a:extLst>
+              <a:ext uri="{FF2B5EF4-FFF2-40B4-BE49-F238E27FC236}">
+                <a16:creationId xmlns:a16="http://schemas.microsoft.com/office/drawing/2014/main" id="{9A4ABAF4-73E6-4999-AD5B-13AEEAA2E3F6}"/>
+              </a:ext>
+            </a:extLst>
+          </p:cNvPr>
+          <p:cNvSpPr txBox="1"/>
+          <p:nvPr/>
+        </p:nvSpPr>
+        <p:spPr>
+          <a:xfrm>
+            <a:off x="1661439" y="3300894"/>
+            <a:ext cx="731520" cy="338554"/>
+          </a:xfrm>
+          <a:prstGeom prst="rect">
+            <a:avLst/>
+          </a:prstGeom>
+          <a:noFill/>
+        </p:spPr>
+        <p:txBody>
+          <a:bodyPr wrap="square" rtlCol="0">
+            <a:spAutoFit/>
+          </a:bodyPr>
+          <a:lstStyle/>
+          <a:p>
+            <a:r>
+              <a:rPr lang="en-GB" sz="1600" dirty="0"/>
+              <a:t>Time</a:t>
+            </a:r>
+          </a:p>
+        </p:txBody>
+      </p:sp>
+      <p:sp>
+        <p:nvSpPr>
+          <p:cNvPr id="8" name="TextBox 7">
+            <a:extLst>
+              <a:ext uri="{FF2B5EF4-FFF2-40B4-BE49-F238E27FC236}">
+                <a16:creationId xmlns:a16="http://schemas.microsoft.com/office/drawing/2014/main" id="{E3141EE2-0753-496D-89A8-DFC8053ED528}"/>
+              </a:ext>
+            </a:extLst>
+          </p:cNvPr>
+          <p:cNvSpPr txBox="1"/>
+          <p:nvPr/>
+        </p:nvSpPr>
+        <p:spPr>
+          <a:xfrm>
+            <a:off x="-8703" y="1874658"/>
+            <a:ext cx="1065975" cy="338554"/>
+          </a:xfrm>
+          <a:prstGeom prst="rect">
+            <a:avLst/>
+          </a:prstGeom>
+          <a:noFill/>
+        </p:spPr>
+        <p:txBody>
+          <a:bodyPr wrap="square" rtlCol="0">
+            <a:spAutoFit/>
+          </a:bodyPr>
+          <a:lstStyle/>
+          <a:p>
+            <a:r>
+              <a:rPr lang="en-GB" sz="1600" dirty="0"/>
+              <a:t>Budgets</a:t>
+            </a:r>
+          </a:p>
+        </p:txBody>
+      </p:sp>
+      <p:sp>
+        <p:nvSpPr>
+          <p:cNvPr id="9" name="TextBox 8">
+            <a:extLst>
+              <a:ext uri="{FF2B5EF4-FFF2-40B4-BE49-F238E27FC236}">
+                <a16:creationId xmlns:a16="http://schemas.microsoft.com/office/drawing/2014/main" id="{5E5C4A68-2D05-4A6F-8E61-1B4F6BA0CA6F}"/>
+              </a:ext>
+            </a:extLst>
+          </p:cNvPr>
+          <p:cNvSpPr txBox="1"/>
+          <p:nvPr/>
+        </p:nvSpPr>
+        <p:spPr>
+          <a:xfrm>
+            <a:off x="3629752" y="1318488"/>
+            <a:ext cx="7813067" cy="861774"/>
+          </a:xfrm>
+          <a:prstGeom prst="rect">
+            <a:avLst/>
+          </a:prstGeom>
+          <a:noFill/>
+        </p:spPr>
+        <p:txBody>
+          <a:bodyPr wrap="square" rtlCol="0">
+            <a:spAutoFit/>
+          </a:bodyPr>
+          <a:lstStyle/>
+          <a:p>
+            <a:r>
+              <a:rPr lang="en-GB" dirty="0"/>
+              <a:t>Scenario 1: exponential increase in population</a:t>
+            </a:r>
+          </a:p>
+          <a:p>
+            <a:r>
+              <a:rPr lang="en-GB" dirty="0"/>
+              <a:t> </a:t>
+            </a:r>
+          </a:p>
+          <a:p>
+            <a:r>
+              <a:rPr lang="en-GB" sz="1400" dirty="0"/>
+              <a:t>Example explanation: The rate of human population growth increases exponentially</a:t>
+            </a:r>
+          </a:p>
+        </p:txBody>
+      </p:sp>
+      <p:sp>
+        <p:nvSpPr>
+          <p:cNvPr id="10" name="TextBox 9">
+            <a:extLst>
+              <a:ext uri="{FF2B5EF4-FFF2-40B4-BE49-F238E27FC236}">
+                <a16:creationId xmlns:a16="http://schemas.microsoft.com/office/drawing/2014/main" id="{C6ACFE24-F61C-48AF-8C01-CF8B076B1B73}"/>
+              </a:ext>
+            </a:extLst>
+          </p:cNvPr>
+          <p:cNvSpPr txBox="1"/>
+          <p:nvPr/>
+        </p:nvSpPr>
+        <p:spPr>
+          <a:xfrm>
+            <a:off x="3794332" y="85458"/>
+            <a:ext cx="3453787" cy="369332"/>
+          </a:xfrm>
+          <a:prstGeom prst="rect">
+            <a:avLst/>
+          </a:prstGeom>
+          <a:noFill/>
+        </p:spPr>
+        <p:txBody>
+          <a:bodyPr wrap="square" rtlCol="0">
+            <a:spAutoFit/>
+          </a:bodyPr>
+          <a:lstStyle/>
+          <a:p>
+            <a:r>
+              <a:rPr lang="en-GB" b="1" dirty="0"/>
+              <a:t>multiple population scenarios</a:t>
+            </a:r>
+          </a:p>
+        </p:txBody>
+      </p:sp>
+      <p:cxnSp>
+        <p:nvCxnSpPr>
+          <p:cNvPr id="12" name="Straight Connector 11">
+            <a:extLst>
+              <a:ext uri="{FF2B5EF4-FFF2-40B4-BE49-F238E27FC236}">
+                <a16:creationId xmlns:a16="http://schemas.microsoft.com/office/drawing/2014/main" id="{13CD1CCC-8D4D-4B28-B55B-9B98BE7FAE8D}"/>
+              </a:ext>
+            </a:extLst>
+          </p:cNvPr>
+          <p:cNvCxnSpPr/>
+          <p:nvPr/>
+        </p:nvCxnSpPr>
+        <p:spPr>
+          <a:xfrm>
+            <a:off x="827157" y="4004335"/>
+            <a:ext cx="0" cy="2113808"/>
+          </a:xfrm>
+          <a:prstGeom prst="line">
+            <a:avLst/>
+          </a:prstGeom>
+          <a:ln w="19050"/>
+        </p:spPr>
+        <p:style>
+          <a:lnRef idx="1">
+            <a:schemeClr val="dk1"/>
+          </a:lnRef>
+          <a:fillRef idx="0">
+            <a:schemeClr val="dk1"/>
+          </a:fillRef>
+          <a:effectRef idx="0">
+            <a:schemeClr val="dk1"/>
+          </a:effectRef>
+          <a:fontRef idx="minor">
+            <a:schemeClr val="tx1"/>
+          </a:fontRef>
+        </p:style>
+      </p:cxnSp>
+      <p:cxnSp>
+        <p:nvCxnSpPr>
+          <p:cNvPr id="13" name="Straight Connector 12">
+            <a:extLst>
+              <a:ext uri="{FF2B5EF4-FFF2-40B4-BE49-F238E27FC236}">
+                <a16:creationId xmlns:a16="http://schemas.microsoft.com/office/drawing/2014/main" id="{42154637-D5A3-457A-9C51-5EB29B397B3F}"/>
+              </a:ext>
+            </a:extLst>
+          </p:cNvPr>
+          <p:cNvCxnSpPr>
+            <a:cxnSpLocks/>
+          </p:cNvCxnSpPr>
+          <p:nvPr/>
+        </p:nvCxnSpPr>
+        <p:spPr>
+          <a:xfrm flipH="1">
+            <a:off x="827157" y="6118143"/>
+            <a:ext cx="2196935" cy="0"/>
+          </a:xfrm>
+          <a:prstGeom prst="line">
+            <a:avLst/>
+          </a:prstGeom>
+          <a:ln w="19050"/>
+        </p:spPr>
+        <p:style>
+          <a:lnRef idx="1">
+            <a:schemeClr val="dk1"/>
+          </a:lnRef>
+          <a:fillRef idx="0">
+            <a:schemeClr val="dk1"/>
+          </a:fillRef>
+          <a:effectRef idx="0">
+            <a:schemeClr val="dk1"/>
+          </a:effectRef>
+          <a:fontRef idx="minor">
+            <a:schemeClr val="tx1"/>
+          </a:fontRef>
+        </p:style>
+      </p:cxnSp>
+      <p:sp>
+        <p:nvSpPr>
+          <p:cNvPr id="15" name="TextBox 14">
+            <a:extLst>
+              <a:ext uri="{FF2B5EF4-FFF2-40B4-BE49-F238E27FC236}">
+                <a16:creationId xmlns:a16="http://schemas.microsoft.com/office/drawing/2014/main" id="{33846330-04EA-4A07-91DB-CDDF09C4B11E}"/>
+              </a:ext>
+            </a:extLst>
+          </p:cNvPr>
+          <p:cNvSpPr txBox="1"/>
+          <p:nvPr/>
+        </p:nvSpPr>
+        <p:spPr>
+          <a:xfrm>
+            <a:off x="1660013" y="6153769"/>
+            <a:ext cx="731520" cy="338554"/>
+          </a:xfrm>
+          <a:prstGeom prst="rect">
+            <a:avLst/>
+          </a:prstGeom>
+          <a:noFill/>
+        </p:spPr>
+        <p:txBody>
+          <a:bodyPr wrap="square" rtlCol="0">
+            <a:spAutoFit/>
+          </a:bodyPr>
+          <a:lstStyle/>
+          <a:p>
+            <a:r>
+              <a:rPr lang="en-GB" sz="1600" dirty="0"/>
+              <a:t>Time</a:t>
+            </a:r>
+          </a:p>
+        </p:txBody>
+      </p:sp>
+      <p:sp>
+        <p:nvSpPr>
+          <p:cNvPr id="16" name="TextBox 15">
+            <a:extLst>
+              <a:ext uri="{FF2B5EF4-FFF2-40B4-BE49-F238E27FC236}">
+                <a16:creationId xmlns:a16="http://schemas.microsoft.com/office/drawing/2014/main" id="{7DEB53FD-964E-400B-8FB3-9AD5635AF954}"/>
+              </a:ext>
+            </a:extLst>
+          </p:cNvPr>
+          <p:cNvSpPr txBox="1"/>
+          <p:nvPr/>
+        </p:nvSpPr>
+        <p:spPr>
+          <a:xfrm>
+            <a:off x="-10129" y="4727533"/>
+            <a:ext cx="1065975" cy="338554"/>
+          </a:xfrm>
+          <a:prstGeom prst="rect">
+            <a:avLst/>
+          </a:prstGeom>
+          <a:noFill/>
+        </p:spPr>
+        <p:txBody>
+          <a:bodyPr wrap="square" rtlCol="0">
+            <a:spAutoFit/>
+          </a:bodyPr>
+          <a:lstStyle/>
+          <a:p>
+            <a:r>
+              <a:rPr lang="en-GB" sz="1600" dirty="0"/>
+              <a:t>Budgets</a:t>
+            </a:r>
+          </a:p>
+        </p:txBody>
+      </p:sp>
+      <p:sp>
+        <p:nvSpPr>
+          <p:cNvPr id="18" name="Freeform: Shape 17">
+            <a:extLst>
+              <a:ext uri="{FF2B5EF4-FFF2-40B4-BE49-F238E27FC236}">
+                <a16:creationId xmlns:a16="http://schemas.microsoft.com/office/drawing/2014/main" id="{AEFF909D-D23E-4462-9AC5-0F5EF9353780}"/>
+              </a:ext>
+            </a:extLst>
+          </p:cNvPr>
+          <p:cNvSpPr/>
+          <p:nvPr/>
+        </p:nvSpPr>
+        <p:spPr>
+          <a:xfrm>
+            <a:off x="839000" y="4383993"/>
+            <a:ext cx="2211849" cy="1709158"/>
+          </a:xfrm>
+          <a:custGeom>
+            <a:avLst/>
+            <a:gdLst>
+              <a:gd name="connsiteX0" fmla="*/ 15579 w 2211849"/>
+              <a:gd name="connsiteY0" fmla="*/ 1709158 h 1709158"/>
+              <a:gd name="connsiteX1" fmla="*/ 126675 w 2211849"/>
+              <a:gd name="connsiteY1" fmla="*/ 1256231 h 1709158"/>
+              <a:gd name="connsiteX2" fmla="*/ 947071 w 2211849"/>
+              <a:gd name="connsiteY2" fmla="*/ 1196411 h 1709158"/>
+              <a:gd name="connsiteX3" fmla="*/ 1058166 w 2211849"/>
+              <a:gd name="connsiteY3" fmla="*/ 316194 h 1709158"/>
+              <a:gd name="connsiteX4" fmla="*/ 1972566 w 2211849"/>
+              <a:gd name="connsiteY4" fmla="*/ 170915 h 1709158"/>
+              <a:gd name="connsiteX5" fmla="*/ 2211849 w 2211849"/>
+              <a:gd name="connsiteY5" fmla="*/ 0 h 1709158"/>
+            </a:gdLst>
+            <a:ahLst/>
+            <a:cxnLst>
+              <a:cxn ang="0">
+                <a:pos x="connsiteX0" y="connsiteY0"/>
+              </a:cxn>
+              <a:cxn ang="0">
+                <a:pos x="connsiteX1" y="connsiteY1"/>
+              </a:cxn>
+              <a:cxn ang="0">
+                <a:pos x="connsiteX2" y="connsiteY2"/>
+              </a:cxn>
+              <a:cxn ang="0">
+                <a:pos x="connsiteX3" y="connsiteY3"/>
+              </a:cxn>
+              <a:cxn ang="0">
+                <a:pos x="connsiteX4" y="connsiteY4"/>
+              </a:cxn>
+              <a:cxn ang="0">
+                <a:pos x="connsiteX5" y="connsiteY5"/>
+              </a:cxn>
+            </a:cxnLst>
+            <a:rect l="l" t="t" r="r" b="b"/>
+            <a:pathLst>
+              <a:path w="2211849" h="1709158">
+                <a:moveTo>
+                  <a:pt x="15579" y="1709158"/>
+                </a:moveTo>
+                <a:cubicBezTo>
+                  <a:pt x="-6498" y="1525423"/>
+                  <a:pt x="-28574" y="1341689"/>
+                  <a:pt x="126675" y="1256231"/>
+                </a:cubicBezTo>
+                <a:cubicBezTo>
+                  <a:pt x="281924" y="1170773"/>
+                  <a:pt x="791823" y="1353084"/>
+                  <a:pt x="947071" y="1196411"/>
+                </a:cubicBezTo>
+                <a:cubicBezTo>
+                  <a:pt x="1102320" y="1039738"/>
+                  <a:pt x="887250" y="487110"/>
+                  <a:pt x="1058166" y="316194"/>
+                </a:cubicBezTo>
+                <a:cubicBezTo>
+                  <a:pt x="1229082" y="145278"/>
+                  <a:pt x="1780285" y="223614"/>
+                  <a:pt x="1972566" y="170915"/>
+                </a:cubicBezTo>
+                <a:cubicBezTo>
+                  <a:pt x="2164847" y="118216"/>
+                  <a:pt x="2188348" y="59108"/>
+                  <a:pt x="2211849" y="0"/>
+                </a:cubicBezTo>
+              </a:path>
+            </a:pathLst>
+          </a:custGeom>
+          <a:noFill/>
+        </p:spPr>
+        <p:style>
+          <a:lnRef idx="2">
+            <a:schemeClr val="accent1">
+              <a:shade val="50000"/>
+            </a:schemeClr>
+          </a:lnRef>
+          <a:fillRef idx="1">
+            <a:schemeClr val="accent1"/>
+          </a:fillRef>
+          <a:effectRef idx="0">
+            <a:schemeClr val="accent1"/>
+          </a:effectRef>
+          <a:fontRef idx="minor">
+            <a:schemeClr val="lt1"/>
+          </a:fontRef>
+        </p:style>
+        <p:txBody>
+          <a:bodyPr rtlCol="0" anchor="ctr"/>
+          <a:lstStyle/>
+          <a:p>
+            <a:pPr algn="ctr"/>
+            <a:endParaRPr lang="en-GB"/>
+          </a:p>
+        </p:txBody>
+      </p:sp>
+      <p:sp>
+        <p:nvSpPr>
+          <p:cNvPr id="19" name="TextBox 18">
+            <a:extLst>
+              <a:ext uri="{FF2B5EF4-FFF2-40B4-BE49-F238E27FC236}">
+                <a16:creationId xmlns:a16="http://schemas.microsoft.com/office/drawing/2014/main" id="{E323C445-90F4-45B8-B997-D13439A55C97}"/>
+              </a:ext>
+            </a:extLst>
+          </p:cNvPr>
+          <p:cNvSpPr txBox="1"/>
+          <p:nvPr/>
+        </p:nvSpPr>
+        <p:spPr>
+          <a:xfrm>
+            <a:off x="3629752" y="4522630"/>
+            <a:ext cx="7813067" cy="1077218"/>
+          </a:xfrm>
+          <a:prstGeom prst="rect">
+            <a:avLst/>
+          </a:prstGeom>
+          <a:noFill/>
+        </p:spPr>
+        <p:txBody>
+          <a:bodyPr wrap="square" rtlCol="0">
+            <a:spAutoFit/>
+          </a:bodyPr>
+          <a:lstStyle/>
+          <a:p>
+            <a:r>
+              <a:rPr lang="en-GB" dirty="0"/>
+              <a:t>Scenario 2: Surge population growth</a:t>
+            </a:r>
+          </a:p>
+          <a:p>
+            <a:r>
+              <a:rPr lang="en-GB" dirty="0"/>
+              <a:t> </a:t>
+            </a:r>
+          </a:p>
+          <a:p>
+            <a:r>
+              <a:rPr lang="en-GB" sz="1400" dirty="0"/>
+              <a:t>Example explanation: human population growth is dependent on surges of migration (e.g. for economic reasons)</a:t>
+            </a:r>
+          </a:p>
+        </p:txBody>
+      </p:sp>
+      <p:sp>
+        <p:nvSpPr>
+          <p:cNvPr id="20" name="Freeform: Shape 19">
+            <a:extLst>
+              <a:ext uri="{FF2B5EF4-FFF2-40B4-BE49-F238E27FC236}">
+                <a16:creationId xmlns:a16="http://schemas.microsoft.com/office/drawing/2014/main" id="{0E32B217-0450-4206-B8EC-5C5FB70F0D1A}"/>
+              </a:ext>
+            </a:extLst>
+          </p:cNvPr>
+          <p:cNvSpPr/>
+          <p:nvPr/>
+        </p:nvSpPr>
+        <p:spPr>
+          <a:xfrm>
+            <a:off x="871671" y="1145134"/>
+            <a:ext cx="2076628" cy="2059537"/>
+          </a:xfrm>
+          <a:custGeom>
+            <a:avLst/>
+            <a:gdLst>
+              <a:gd name="connsiteX0" fmla="*/ 0 w 2076628"/>
+              <a:gd name="connsiteY0" fmla="*/ 2059537 h 2059537"/>
+              <a:gd name="connsiteX1" fmla="*/ 1529697 w 2076628"/>
+              <a:gd name="connsiteY1" fmla="*/ 1461331 h 2059537"/>
+              <a:gd name="connsiteX2" fmla="*/ 2076628 w 2076628"/>
+              <a:gd name="connsiteY2" fmla="*/ 0 h 2059537"/>
+              <a:gd name="connsiteX3" fmla="*/ 2076628 w 2076628"/>
+              <a:gd name="connsiteY3" fmla="*/ 0 h 2059537"/>
+            </a:gdLst>
+            <a:ahLst/>
+            <a:cxnLst>
+              <a:cxn ang="0">
+                <a:pos x="connsiteX0" y="connsiteY0"/>
+              </a:cxn>
+              <a:cxn ang="0">
+                <a:pos x="connsiteX1" y="connsiteY1"/>
+              </a:cxn>
+              <a:cxn ang="0">
+                <a:pos x="connsiteX2" y="connsiteY2"/>
+              </a:cxn>
+              <a:cxn ang="0">
+                <a:pos x="connsiteX3" y="connsiteY3"/>
+              </a:cxn>
+            </a:cxnLst>
+            <a:rect l="l" t="t" r="r" b="b"/>
+            <a:pathLst>
+              <a:path w="2076628" h="2059537">
+                <a:moveTo>
+                  <a:pt x="0" y="2059537"/>
+                </a:moveTo>
+                <a:cubicBezTo>
+                  <a:pt x="591796" y="1932062"/>
+                  <a:pt x="1183592" y="1804587"/>
+                  <a:pt x="1529697" y="1461331"/>
+                </a:cubicBezTo>
+                <a:cubicBezTo>
+                  <a:pt x="1875802" y="1118075"/>
+                  <a:pt x="2076628" y="0"/>
+                  <a:pt x="2076628" y="0"/>
+                </a:cubicBezTo>
+                <a:lnTo>
+                  <a:pt x="2076628" y="0"/>
+                </a:lnTo>
+              </a:path>
+            </a:pathLst>
+          </a:custGeom>
+        </p:spPr>
+        <p:style>
+          <a:lnRef idx="1">
+            <a:schemeClr val="accent5"/>
+          </a:lnRef>
+          <a:fillRef idx="0">
+            <a:schemeClr val="accent5"/>
+          </a:fillRef>
+          <a:effectRef idx="0">
+            <a:schemeClr val="accent5"/>
+          </a:effectRef>
+          <a:fontRef idx="minor">
+            <a:schemeClr val="tx1"/>
+          </a:fontRef>
+        </p:style>
+        <p:txBody>
+          <a:bodyPr rtlCol="0" anchor="ctr"/>
+          <a:lstStyle/>
+          <a:p>
+            <a:pPr algn="ctr"/>
+            <a:endParaRPr lang="en-GB"/>
+          </a:p>
+        </p:txBody>
+      </p:sp>
+      <p:sp>
+        <p:nvSpPr>
+          <p:cNvPr id="22" name="TextBox 21">
+            <a:extLst>
+              <a:ext uri="{FF2B5EF4-FFF2-40B4-BE49-F238E27FC236}">
+                <a16:creationId xmlns:a16="http://schemas.microsoft.com/office/drawing/2014/main" id="{DA5DE591-979B-45DF-BDC9-4F4F3FE167DA}"/>
+              </a:ext>
+            </a:extLst>
+          </p:cNvPr>
+          <p:cNvSpPr txBox="1"/>
+          <p:nvPr/>
+        </p:nvSpPr>
+        <p:spPr>
+          <a:xfrm>
+            <a:off x="2514504" y="2462241"/>
+            <a:ext cx="953763" cy="276999"/>
+          </a:xfrm>
+          <a:prstGeom prst="rect">
+            <a:avLst/>
+          </a:prstGeom>
+          <a:noFill/>
+        </p:spPr>
+        <p:txBody>
+          <a:bodyPr wrap="square" rtlCol="0">
+            <a:spAutoFit/>
+          </a:bodyPr>
+          <a:lstStyle/>
+          <a:p>
+            <a:r>
+              <a:rPr lang="en-GB" sz="1200" dirty="0"/>
+              <a:t>User</a:t>
+            </a:r>
+          </a:p>
+        </p:txBody>
+      </p:sp>
+      <p:sp>
+        <p:nvSpPr>
+          <p:cNvPr id="23" name="TextBox 22">
+            <a:extLst>
+              <a:ext uri="{FF2B5EF4-FFF2-40B4-BE49-F238E27FC236}">
+                <a16:creationId xmlns:a16="http://schemas.microsoft.com/office/drawing/2014/main" id="{FF033B73-54EE-4028-ADA4-A9E0916157ED}"/>
+              </a:ext>
+            </a:extLst>
+          </p:cNvPr>
+          <p:cNvSpPr txBox="1"/>
+          <p:nvPr/>
+        </p:nvSpPr>
+        <p:spPr>
+          <a:xfrm>
+            <a:off x="2386537" y="4619672"/>
+            <a:ext cx="953763" cy="276999"/>
+          </a:xfrm>
+          <a:prstGeom prst="rect">
+            <a:avLst/>
+          </a:prstGeom>
+          <a:noFill/>
+        </p:spPr>
+        <p:txBody>
+          <a:bodyPr wrap="square" rtlCol="0">
+            <a:spAutoFit/>
+          </a:bodyPr>
+          <a:lstStyle/>
+          <a:p>
+            <a:r>
+              <a:rPr lang="en-GB" sz="1200" dirty="0"/>
+              <a:t>User</a:t>
+            </a:r>
+          </a:p>
+        </p:txBody>
+      </p:sp>
+      <p:sp>
+        <p:nvSpPr>
+          <p:cNvPr id="2" name="TextBox 1">
+            <a:extLst>
+              <a:ext uri="{FF2B5EF4-FFF2-40B4-BE49-F238E27FC236}">
+                <a16:creationId xmlns:a16="http://schemas.microsoft.com/office/drawing/2014/main" id="{8DAC6F01-5B38-4C35-B33B-EC6A14DEFABB}"/>
+              </a:ext>
+            </a:extLst>
+          </p:cNvPr>
+          <p:cNvSpPr txBox="1"/>
+          <p:nvPr/>
+        </p:nvSpPr>
+        <p:spPr>
+          <a:xfrm>
+            <a:off x="4307079" y="2973936"/>
+            <a:ext cx="4834073" cy="646331"/>
+          </a:xfrm>
+          <a:prstGeom prst="rect">
+            <a:avLst/>
+          </a:prstGeom>
+          <a:noFill/>
+        </p:spPr>
+        <p:txBody>
+          <a:bodyPr wrap="square" rtlCol="0">
+            <a:spAutoFit/>
+          </a:bodyPr>
+          <a:lstStyle/>
+          <a:p>
+            <a:r>
+              <a:rPr lang="en-GB" dirty="0"/>
+              <a:t>** we would then apply the different manager strategies to each of these population scenarios</a:t>
+            </a:r>
+          </a:p>
+        </p:txBody>
+      </p:sp>
+    </p:spTree>
+    <p:extLst>
+      <p:ext uri="{BB962C8B-B14F-4D97-AF65-F5344CB8AC3E}">
+        <p14:creationId xmlns:p14="http://schemas.microsoft.com/office/powerpoint/2010/main" val="4205752630"/>
+      </p:ext>
+    </p:extLst>
+  </p:cSld>
+  <p:clrMapOvr>
+    <a:masterClrMapping/>
+  </p:clrMapOvr>
+</p:sld>
+</file>
+
+<file path=ppt/slides/slide6.xml><?xml version="1.0" encoding="utf-8"?>
+<p:sld xmlns:a="http://schemas.openxmlformats.org/drawingml/2006/main" xmlns:r="http://schemas.openxmlformats.org/officeDocument/2006/relationships" xmlns:p="http://schemas.openxmlformats.org/presentationml/2006/main">
+  <p:cSld>
+    <p:spTree>
+      <p:nvGrpSpPr>
+        <p:cNvPr id="1" name=""/>
+        <p:cNvGrpSpPr/>
+        <p:nvPr/>
+      </p:nvGrpSpPr>
+      <p:grpSpPr>
+        <a:xfrm>
+          <a:off x="0" y="0"/>
+          <a:ext cx="0" cy="0"/>
+          <a:chOff x="0" y="0"/>
+          <a:chExt cx="0" cy="0"/>
+        </a:xfrm>
+      </p:grpSpPr>
+      <p:sp>
+        <p:nvSpPr>
+          <p:cNvPr id="3" name="TextBox 2">
+            <a:extLst>
+              <a:ext uri="{FF2B5EF4-FFF2-40B4-BE49-F238E27FC236}">
+                <a16:creationId xmlns:a16="http://schemas.microsoft.com/office/drawing/2014/main" id="{4F228FE7-18D2-415A-AD2C-E699EF849636}"/>
+              </a:ext>
+            </a:extLst>
+          </p:cNvPr>
+          <p:cNvSpPr txBox="1"/>
+          <p:nvPr/>
+        </p:nvSpPr>
+        <p:spPr>
+          <a:xfrm>
+            <a:off x="230735" y="196553"/>
+            <a:ext cx="4965107" cy="369332"/>
+          </a:xfrm>
+          <a:prstGeom prst="rect">
+            <a:avLst/>
+          </a:prstGeom>
+          <a:noFill/>
+        </p:spPr>
+        <p:txBody>
+          <a:bodyPr wrap="square" rtlCol="0">
+            <a:spAutoFit/>
+          </a:bodyPr>
+          <a:lstStyle/>
+          <a:p>
+            <a:r>
+              <a:rPr lang="en-GB" dirty="0"/>
+              <a:t>Additional ideas (would increase complexity)</a:t>
+            </a:r>
+          </a:p>
+        </p:txBody>
+      </p:sp>
+      <p:sp>
+        <p:nvSpPr>
+          <p:cNvPr id="6" name="TextBox 5">
+            <a:extLst>
+              <a:ext uri="{FF2B5EF4-FFF2-40B4-BE49-F238E27FC236}">
+                <a16:creationId xmlns:a16="http://schemas.microsoft.com/office/drawing/2014/main" id="{764B3A91-7CF5-4A38-B17B-AD0285AD7EC1}"/>
+              </a:ext>
+            </a:extLst>
+          </p:cNvPr>
+          <p:cNvSpPr txBox="1"/>
+          <p:nvPr/>
+        </p:nvSpPr>
+        <p:spPr>
+          <a:xfrm>
+            <a:off x="341831" y="931492"/>
+            <a:ext cx="4700187" cy="738664"/>
+          </a:xfrm>
+          <a:prstGeom prst="rect">
+            <a:avLst/>
+          </a:prstGeom>
+          <a:noFill/>
+        </p:spPr>
+        <p:txBody>
+          <a:bodyPr wrap="square" rtlCol="0">
+            <a:spAutoFit/>
+          </a:bodyPr>
+          <a:lstStyle/>
+          <a:p>
+            <a:r>
+              <a:rPr lang="en-GB" sz="1400" dirty="0"/>
+              <a:t>Run all scenarios on users who act individually and then on user who act together (individual versus indigenous land titles)</a:t>
             </a:r>
           </a:p>
         </p:txBody>

</xml_diff>